<commit_message>
some fixes for first video
</commit_message>
<xml_diff>
--- a/Presentations/UI5_001.pptx
+++ b/Presentations/UI5_001.pptx
@@ -768,7 +768,7 @@
               </a:spcAft>
               <a:buNone/>
             </a:pPr>
-            <a:endParaRPr/>
+            <a:endParaRPr dirty="0"/>
           </a:p>
         </p:txBody>
       </p:sp>
@@ -1080,7 +1080,7 @@
               </a:spcAft>
               <a:buNone/>
             </a:pPr>
-            <a:endParaRPr/>
+            <a:endParaRPr dirty="0"/>
           </a:p>
         </p:txBody>
       </p:sp>
@@ -11871,10 +11871,10 @@
       </p:pic>
       <p:pic>
         <p:nvPicPr>
-          <p:cNvPr id="16" name="Picture 15" descr="A picture containing drawing&#10;&#10;Description automatically generated">
+          <p:cNvPr id="15" name="Graphic 14">
             <a:extLst>
               <a:ext uri="{FF2B5EF4-FFF2-40B4-BE49-F238E27FC236}">
-                <a16:creationId xmlns:a16="http://schemas.microsoft.com/office/drawing/2014/main" id="{0A25BF91-C164-43B3-9D3E-026EB59B243C}"/>
+                <a16:creationId xmlns:a16="http://schemas.microsoft.com/office/drawing/2014/main" id="{7D9B9FDD-F0AD-461D-B1F6-84FA1236DC76}"/>
               </a:ext>
             </a:extLst>
           </p:cNvPr>
@@ -11889,6 +11889,9 @@
               <a:ext uri="{28A0092B-C50C-407E-A947-70E740481C1C}">
                 <a14:useLocalDpi xmlns:a14="http://schemas.microsoft.com/office/drawing/2010/main" val="0"/>
               </a:ext>
+              <a:ext uri="{96DAC541-7B7A-43D3-8B79-37D633B846F1}">
+                <asvg:svgBlip xmlns:asvg="http://schemas.microsoft.com/office/drawing/2016/SVG/main" r:embed="rId16"/>
+              </a:ext>
             </a:extLst>
           </a:blip>
           <a:stretch>
@@ -11897,53 +11900,14 @@
         </p:blipFill>
         <p:spPr>
           <a:xfrm>
-            <a:off x="10158175" y="3950018"/>
-            <a:ext cx="1774243" cy="709697"/>
+            <a:off x="10119967" y="4031625"/>
+            <a:ext cx="1952625" cy="600075"/>
           </a:xfrm>
           <a:prstGeom prst="rect">
             <a:avLst/>
           </a:prstGeom>
         </p:spPr>
       </p:pic>
-      <p:sp>
-        <p:nvSpPr>
-          <p:cNvPr id="17" name="TextBox 16">
-            <a:extLst>
-              <a:ext uri="{FF2B5EF4-FFF2-40B4-BE49-F238E27FC236}">
-                <a16:creationId xmlns:a16="http://schemas.microsoft.com/office/drawing/2014/main" id="{2C593B7C-4AE4-4CAA-A847-6CA9D05EE5FC}"/>
-              </a:ext>
-            </a:extLst>
-          </p:cNvPr>
-          <p:cNvSpPr txBox="1"/>
-          <p:nvPr userDrawn="1"/>
-        </p:nvSpPr>
-        <p:spPr>
-          <a:xfrm>
-            <a:off x="10235088" y="4496641"/>
-            <a:ext cx="1774243" cy="353943"/>
-          </a:xfrm>
-          <a:prstGeom prst="rect">
-            <a:avLst/>
-          </a:prstGeom>
-          <a:noFill/>
-        </p:spPr>
-        <p:txBody>
-          <a:bodyPr wrap="square" rtlCol="0">
-            <a:spAutoFit/>
-          </a:bodyPr>
-          <a:lstStyle/>
-          <a:p>
-            <a:r>
-              <a:rPr lang="en-US" sz="1700" dirty="0">
-                <a:solidFill>
-                  <a:schemeClr val="bg1"/>
-                </a:solidFill>
-              </a:rPr>
-              <a:t>www.cimt-ag.de</a:t>
-            </a:r>
-          </a:p>
-        </p:txBody>
-      </p:sp>
     </p:spTree>
   </p:cSld>
   <p:clrMap bg1="lt1" tx1="dk1" bg2="dk2" tx2="lt2" accent1="accent1" accent2="accent2" accent3="accent3" accent4="accent4" accent5="accent5" accent6="accent6" hlink="hlink" folHlink="folHlink"/>
@@ -12869,27 +12833,7 @@
           </a:bodyPr>
           <a:lstStyle/>
           <a:p>
-            <a:pPr marL="0" marR="0" lvl="0" indent="0" algn="l" rtl="0">
-              <a:spcBef>
-                <a:spcPts val="0"/>
-              </a:spcBef>
-              <a:spcAft>
-                <a:spcPts val="0"/>
-              </a:spcAft>
-              <a:buNone/>
-            </a:pPr>
-            <a:r>
-              <a:rPr lang="en" sz="1800" b="0" i="0" u="none" strike="noStrike" cap="none">
-                <a:solidFill>
-                  <a:srgbClr val="0070C0"/>
-                </a:solidFill>
-                <a:latin typeface="Noto Sans Symbols"/>
-                <a:ea typeface="Noto Sans Symbols"/>
-                <a:cs typeface="Noto Sans Symbols"/>
-                <a:sym typeface="Noto Sans Symbols"/>
-              </a:rPr>
-              <a:t>  </a:t>
-            </a:r>
+            <a:pPr lvl="0"/>
             <a:r>
               <a:rPr lang="en" sz="1800" b="0" i="0" u="none" strike="noStrike" cap="none">
                 <a:solidFill>
@@ -12900,9 +12844,21 @@
                 <a:cs typeface="Calibri"/>
                 <a:sym typeface="Calibri"/>
               </a:rPr>
-              <a:t>Presented by: Mahdi J.Ansari</a:t>
-            </a:r>
-            <a:endParaRPr sz="1800">
+              <a:t>Presented </a:t>
+            </a:r>
+            <a:r>
+              <a:rPr lang="en" sz="1800" b="0" i="0" u="none" strike="noStrike" cap="none" dirty="0">
+                <a:solidFill>
+                  <a:srgbClr val="0070C0"/>
+                </a:solidFill>
+                <a:latin typeface="Calibri"/>
+                <a:ea typeface="Calibri"/>
+                <a:cs typeface="Calibri"/>
+                <a:sym typeface="Calibri"/>
+              </a:rPr>
+              <a:t>by: Mahdi J.Ansari</a:t>
+            </a:r>
+            <a:endParaRPr sz="1800" dirty="0">
               <a:solidFill>
                 <a:srgbClr val="0070C0"/>
               </a:solidFill>
@@ -12949,19 +12905,7 @@
               <a:buNone/>
             </a:pPr>
             <a:r>
-              <a:rPr lang="en" sz="1800">
-                <a:solidFill>
-                  <a:srgbClr val="0070C0"/>
-                </a:solidFill>
-                <a:latin typeface="Noto Sans Symbols"/>
-                <a:ea typeface="Noto Sans Symbols"/>
-                <a:cs typeface="Noto Sans Symbols"/>
-                <a:sym typeface="Noto Sans Symbols"/>
-              </a:rPr>
-              <a:t> </a:t>
-            </a:r>
-            <a:r>
-              <a:rPr lang="en" sz="1800">
+              <a:rPr lang="en" sz="1800" dirty="0">
                 <a:solidFill>
                   <a:srgbClr val="0070C0"/>
                 </a:solidFill>
@@ -12972,7 +12916,7 @@
               </a:rPr>
               <a:t>www.mjzsoft.com</a:t>
             </a:r>
-            <a:endParaRPr sz="1800">
+            <a:endParaRPr sz="1800" dirty="0">
               <a:solidFill>
                 <a:srgbClr val="0070C0"/>
               </a:solidFill>
@@ -13019,19 +12963,7 @@
               <a:buNone/>
             </a:pPr>
             <a:r>
-              <a:rPr lang="en" sz="1800">
-                <a:solidFill>
-                  <a:srgbClr val="0070C0"/>
-                </a:solidFill>
-                <a:latin typeface="Noto Sans Symbols"/>
-                <a:ea typeface="Noto Sans Symbols"/>
-                <a:cs typeface="Noto Sans Symbols"/>
-                <a:sym typeface="Noto Sans Symbols"/>
-              </a:rPr>
-              <a:t> </a:t>
-            </a:r>
-            <a:r>
-              <a:rPr lang="en" sz="1800">
+              <a:rPr lang="en" sz="1800" dirty="0">
                 <a:solidFill>
                   <a:srgbClr val="0070C0"/>
                 </a:solidFill>
@@ -13042,7 +12974,7 @@
               </a:rPr>
               <a:t>linkedin.com/in/mjbza/</a:t>
             </a:r>
-            <a:endParaRPr/>
+            <a:endParaRPr dirty="0"/>
           </a:p>
         </p:txBody>
       </p:sp>
@@ -13425,7 +13357,7 @@
         <p:spPr>
           <a:xfrm>
             <a:off x="152400" y="1379577"/>
-            <a:ext cx="8490066" cy="5478423"/>
+            <a:ext cx="8490066" cy="5262979"/>
           </a:xfrm>
           <a:prstGeom prst="rect">
             <a:avLst/>
@@ -13587,13 +13519,7 @@
               <a:rPr lang="en-US" dirty="0">
                 <a:latin typeface="Consolas" panose="020B0609020204030204" pitchFamily="49" charset="0"/>
               </a:rPr>
-              <a:t>More </a:t>
-            </a:r>
-            <a:r>
-              <a:rPr lang="en-US" dirty="0" err="1">
-                <a:latin typeface="Consolas" panose="020B0609020204030204" pitchFamily="49" charset="0"/>
-              </a:rPr>
-              <a:t>Bootstarpping</a:t>
+              <a:t>More Bootstrapping</a:t>
             </a:r>
             <a:r>
               <a:rPr lang="en-US" dirty="0">
@@ -14215,13 +14141,17 @@
                 </a:solidFill>
                 <a:latin typeface="Consolas" panose="020B0609020204030204" pitchFamily="49" charset="0"/>
               </a:rPr>
-              <a:t>&lt;/script&gt;</a:t>
-            </a:r>
-            <a:endParaRPr lang="en-US" dirty="0">
-              <a:latin typeface="Consolas" panose="020B0609020204030204" pitchFamily="49" charset="0"/>
-            </a:endParaRPr>
-          </a:p>
-          <a:p>
+              <a:t>&lt;/</a:t>
+            </a:r>
+            <a:r>
+              <a:rPr lang="en-US">
+                <a:solidFill>
+                  <a:srgbClr val="800000"/>
+                </a:solidFill>
+                <a:latin typeface="Consolas" panose="020B0609020204030204" pitchFamily="49" charset="0"/>
+              </a:rPr>
+              <a:t>script&gt;</a:t>
+            </a:r>
             <a:r>
               <a:rPr lang="en-US" dirty="0">
                 <a:latin typeface="Consolas" panose="020B0609020204030204" pitchFamily="49" charset="0"/>
@@ -15926,9 +15856,21 @@
                 <a:solidFill>
                   <a:srgbClr val="0000FF"/>
                 </a:solidFill>
-                <a:latin typeface="Consolas" panose="020B0609020204030204" pitchFamily="49" charset="0"/>
-              </a:rPr>
-              <a:t>"../openui5/openui5-runtime-1.70.0/resources/sap-ui-core.js"</a:t>
+                <a:highlight>
+                  <a:srgbClr val="FFFF00"/>
+                </a:highlight>
+                <a:latin typeface="Consolas" panose="020B0609020204030204" pitchFamily="49" charset="0"/>
+              </a:rPr>
+              <a:t>"../</a:t>
+            </a:r>
+            <a:r>
+              <a:rPr lang="en-US" dirty="0">
+                <a:solidFill>
+                  <a:srgbClr val="0000FF"/>
+                </a:solidFill>
+                <a:latin typeface="Consolas" panose="020B0609020204030204" pitchFamily="49" charset="0"/>
+              </a:rPr>
+              <a:t>openui5/openui5-runtime-1.70.0/resources/sap-ui-core.js"</a:t>
             </a:r>
             <a:endParaRPr lang="en-US" dirty="0">
               <a:latin typeface="Consolas" panose="020B0609020204030204" pitchFamily="49" charset="0"/>
@@ -16243,7 +16185,7 @@
               <a:rPr lang="en-US" dirty="0">
                 <a:latin typeface="Consolas" panose="020B0609020204030204" pitchFamily="49" charset="0"/>
               </a:rPr>
-              <a:t>                </a:t>
+              <a:t>        </a:t>
             </a:r>
             <a:r>
               <a:rPr lang="en-US" dirty="0">
@@ -17695,6 +17637,7 @@
       <p:sp>
         <p:nvSpPr>
           <p:cNvPr id="9" name="TextBox 8">
+            <a:hlinkClick r:id="rId5"/>
             <a:extLst>
               <a:ext uri="{FF2B5EF4-FFF2-40B4-BE49-F238E27FC236}">
                 <a16:creationId xmlns:a16="http://schemas.microsoft.com/office/drawing/2014/main" id="{7C9F9F8E-A15D-432F-8869-1584866BCC7E}"/>
@@ -17726,7 +17669,7 @@
                   <a:srgbClr val="0070C0"/>
                 </a:solidFill>
               </a:rPr>
-              <a:t>https://help.sap.com/viewer/p/SAP_Web_IDE.</a:t>
+              <a:t>https://help.sap.com/viewer/p/SAP_Web_IDE</a:t>
             </a:r>
           </a:p>
         </p:txBody>
@@ -17986,6 +17929,44 @@
           </a:prstGeom>
         </p:spPr>
       </p:pic>
+      <p:sp>
+        <p:nvSpPr>
+          <p:cNvPr id="2" name="Rectangle 1">
+            <a:extLst>
+              <a:ext uri="{FF2B5EF4-FFF2-40B4-BE49-F238E27FC236}">
+                <a16:creationId xmlns:a16="http://schemas.microsoft.com/office/drawing/2014/main" id="{E7D48125-1C33-4A04-B3E1-19F14F222262}"/>
+              </a:ext>
+            </a:extLst>
+          </p:cNvPr>
+          <p:cNvSpPr/>
+          <p:nvPr/>
+        </p:nvSpPr>
+        <p:spPr>
+          <a:xfrm>
+            <a:off x="1066799" y="6478425"/>
+            <a:ext cx="8618483" cy="307777"/>
+          </a:xfrm>
+          <a:prstGeom prst="rect">
+            <a:avLst/>
+          </a:prstGeom>
+        </p:spPr>
+        <p:txBody>
+          <a:bodyPr wrap="square">
+            <a:spAutoFit/>
+          </a:bodyPr>
+          <a:lstStyle/>
+          <a:p>
+            <a:r>
+              <a:rPr lang="en-US" b="1" dirty="0">
+                <a:solidFill>
+                  <a:srgbClr val="FF0000"/>
+                </a:solidFill>
+              </a:rPr>
+              <a:t>https://account.hanatrial.ondemand.com/cockpit/#/acc/p0123456789trial/accountdashboard</a:t>
+            </a:r>
+          </a:p>
+        </p:txBody>
+      </p:sp>
     </p:spTree>
     <p:extLst>
       <p:ext uri="{BB962C8B-B14F-4D97-AF65-F5344CB8AC3E}">

</xml_diff>

<commit_message>
updated slides for cimply
</commit_message>
<xml_diff>
--- a/Presentations/UI5_001.pptx
+++ b/Presentations/UI5_001.pptx
@@ -1,18 +1,18 @@
 
 <file path=ppt/presentation.xml><?xml version="1.0" encoding="utf-8"?>
-<p:presentation xmlns:a="http://schemas.openxmlformats.org/drawingml/2006/main" xmlns:r="http://schemas.openxmlformats.org/officeDocument/2006/relationships" xmlns:p="http://schemas.openxmlformats.org/presentationml/2006/main" strictFirstAndLastChars="0" saveSubsetFonts="1" autoCompressPictures="0">
+<p:presentation xmlns:a="http://schemas.openxmlformats.org/drawingml/2006/main" xmlns:r="http://schemas.openxmlformats.org/officeDocument/2006/relationships" xmlns:p="http://schemas.openxmlformats.org/presentationml/2006/main" saveSubsetFonts="1">
   <p:sldMasterIdLst>
-    <p:sldMasterId id="2147483648" r:id="rId1"/>
+    <p:sldMasterId id="2147483660" r:id="rId1"/>
   </p:sldMasterIdLst>
   <p:notesMasterIdLst>
     <p:notesMasterId r:id="rId16"/>
   </p:notesMasterIdLst>
   <p:sldIdLst>
     <p:sldId id="256" r:id="rId2"/>
-    <p:sldId id="257" r:id="rId3"/>
-    <p:sldId id="258" r:id="rId4"/>
+    <p:sldId id="258" r:id="rId3"/>
+    <p:sldId id="259" r:id="rId4"/>
     <p:sldId id="269" r:id="rId5"/>
-    <p:sldId id="259" r:id="rId6"/>
+    <p:sldId id="270" r:id="rId6"/>
     <p:sldId id="261" r:id="rId7"/>
     <p:sldId id="260" r:id="rId8"/>
     <p:sldId id="262" r:id="rId9"/>
@@ -26,231 +26,97 @@
   <p:sldSz cx="12192000" cy="6858000"/>
   <p:notesSz cx="6858000" cy="9144000"/>
   <p:defaultTextStyle>
-    <a:defPPr marR="0" lvl="0" algn="l" rtl="0">
-      <a:lnSpc>
-        <a:spcPct val="100000"/>
-      </a:lnSpc>
-      <a:spcBef>
-        <a:spcPts val="0"/>
-      </a:spcBef>
-      <a:spcAft>
-        <a:spcPts val="0"/>
-      </a:spcAft>
+    <a:defPPr>
+      <a:defRPr lang="en-US"/>
     </a:defPPr>
-    <a:lvl1pPr marR="0" lvl="0" algn="l" rtl="0">
-      <a:lnSpc>
-        <a:spcPct val="100000"/>
-      </a:lnSpc>
-      <a:spcBef>
-        <a:spcPts val="0"/>
-      </a:spcBef>
-      <a:spcAft>
-        <a:spcPts val="0"/>
-      </a:spcAft>
-      <a:buClr>
-        <a:srgbClr val="000000"/>
-      </a:buClr>
-      <a:buFont typeface="Arial"/>
-      <a:defRPr sz="1400" b="0" i="0" u="none" strike="noStrike" cap="none">
+    <a:lvl1pPr marL="0" algn="l" defTabSz="914400" rtl="0" eaLnBrk="1" latinLnBrk="0" hangingPunct="1">
+      <a:defRPr sz="1800" kern="1200">
         <a:solidFill>
-          <a:srgbClr val="000000"/>
+          <a:schemeClr val="tx1"/>
         </a:solidFill>
-        <a:latin typeface="Arial"/>
-        <a:ea typeface="Arial"/>
-        <a:cs typeface="Arial"/>
-        <a:sym typeface="Arial"/>
+        <a:latin typeface="+mn-lt"/>
+        <a:ea typeface="+mn-ea"/>
+        <a:cs typeface="+mn-cs"/>
       </a:defRPr>
     </a:lvl1pPr>
-    <a:lvl2pPr marR="0" lvl="1" algn="l" rtl="0">
-      <a:lnSpc>
-        <a:spcPct val="100000"/>
-      </a:lnSpc>
-      <a:spcBef>
-        <a:spcPts val="0"/>
-      </a:spcBef>
-      <a:spcAft>
-        <a:spcPts val="0"/>
-      </a:spcAft>
-      <a:buClr>
-        <a:srgbClr val="000000"/>
-      </a:buClr>
-      <a:buFont typeface="Arial"/>
-      <a:defRPr sz="1400" b="0" i="0" u="none" strike="noStrike" cap="none">
+    <a:lvl2pPr marL="457200" algn="l" defTabSz="914400" rtl="0" eaLnBrk="1" latinLnBrk="0" hangingPunct="1">
+      <a:defRPr sz="1800" kern="1200">
         <a:solidFill>
-          <a:srgbClr val="000000"/>
+          <a:schemeClr val="tx1"/>
         </a:solidFill>
-        <a:latin typeface="Arial"/>
-        <a:ea typeface="Arial"/>
-        <a:cs typeface="Arial"/>
-        <a:sym typeface="Arial"/>
+        <a:latin typeface="+mn-lt"/>
+        <a:ea typeface="+mn-ea"/>
+        <a:cs typeface="+mn-cs"/>
       </a:defRPr>
     </a:lvl2pPr>
-    <a:lvl3pPr marR="0" lvl="2" algn="l" rtl="0">
-      <a:lnSpc>
-        <a:spcPct val="100000"/>
-      </a:lnSpc>
-      <a:spcBef>
-        <a:spcPts val="0"/>
-      </a:spcBef>
-      <a:spcAft>
-        <a:spcPts val="0"/>
-      </a:spcAft>
-      <a:buClr>
-        <a:srgbClr val="000000"/>
-      </a:buClr>
-      <a:buFont typeface="Arial"/>
-      <a:defRPr sz="1400" b="0" i="0" u="none" strike="noStrike" cap="none">
+    <a:lvl3pPr marL="914400" algn="l" defTabSz="914400" rtl="0" eaLnBrk="1" latinLnBrk="0" hangingPunct="1">
+      <a:defRPr sz="1800" kern="1200">
         <a:solidFill>
-          <a:srgbClr val="000000"/>
+          <a:schemeClr val="tx1"/>
         </a:solidFill>
-        <a:latin typeface="Arial"/>
-        <a:ea typeface="Arial"/>
-        <a:cs typeface="Arial"/>
-        <a:sym typeface="Arial"/>
+        <a:latin typeface="+mn-lt"/>
+        <a:ea typeface="+mn-ea"/>
+        <a:cs typeface="+mn-cs"/>
       </a:defRPr>
     </a:lvl3pPr>
-    <a:lvl4pPr marR="0" lvl="3" algn="l" rtl="0">
-      <a:lnSpc>
-        <a:spcPct val="100000"/>
-      </a:lnSpc>
-      <a:spcBef>
-        <a:spcPts val="0"/>
-      </a:spcBef>
-      <a:spcAft>
-        <a:spcPts val="0"/>
-      </a:spcAft>
-      <a:buClr>
-        <a:srgbClr val="000000"/>
-      </a:buClr>
-      <a:buFont typeface="Arial"/>
-      <a:defRPr sz="1400" b="0" i="0" u="none" strike="noStrike" cap="none">
+    <a:lvl4pPr marL="1371600" algn="l" defTabSz="914400" rtl="0" eaLnBrk="1" latinLnBrk="0" hangingPunct="1">
+      <a:defRPr sz="1800" kern="1200">
         <a:solidFill>
-          <a:srgbClr val="000000"/>
+          <a:schemeClr val="tx1"/>
         </a:solidFill>
-        <a:latin typeface="Arial"/>
-        <a:ea typeface="Arial"/>
-        <a:cs typeface="Arial"/>
-        <a:sym typeface="Arial"/>
+        <a:latin typeface="+mn-lt"/>
+        <a:ea typeface="+mn-ea"/>
+        <a:cs typeface="+mn-cs"/>
       </a:defRPr>
     </a:lvl4pPr>
-    <a:lvl5pPr marR="0" lvl="4" algn="l" rtl="0">
-      <a:lnSpc>
-        <a:spcPct val="100000"/>
-      </a:lnSpc>
-      <a:spcBef>
-        <a:spcPts val="0"/>
-      </a:spcBef>
-      <a:spcAft>
-        <a:spcPts val="0"/>
-      </a:spcAft>
-      <a:buClr>
-        <a:srgbClr val="000000"/>
-      </a:buClr>
-      <a:buFont typeface="Arial"/>
-      <a:defRPr sz="1400" b="0" i="0" u="none" strike="noStrike" cap="none">
+    <a:lvl5pPr marL="1828800" algn="l" defTabSz="914400" rtl="0" eaLnBrk="1" latinLnBrk="0" hangingPunct="1">
+      <a:defRPr sz="1800" kern="1200">
         <a:solidFill>
-          <a:srgbClr val="000000"/>
+          <a:schemeClr val="tx1"/>
         </a:solidFill>
-        <a:latin typeface="Arial"/>
-        <a:ea typeface="Arial"/>
-        <a:cs typeface="Arial"/>
-        <a:sym typeface="Arial"/>
+        <a:latin typeface="+mn-lt"/>
+        <a:ea typeface="+mn-ea"/>
+        <a:cs typeface="+mn-cs"/>
       </a:defRPr>
     </a:lvl5pPr>
-    <a:lvl6pPr marR="0" lvl="5" algn="l" rtl="0">
-      <a:lnSpc>
-        <a:spcPct val="100000"/>
-      </a:lnSpc>
-      <a:spcBef>
-        <a:spcPts val="0"/>
-      </a:spcBef>
-      <a:spcAft>
-        <a:spcPts val="0"/>
-      </a:spcAft>
-      <a:buClr>
-        <a:srgbClr val="000000"/>
-      </a:buClr>
-      <a:buFont typeface="Arial"/>
-      <a:defRPr sz="1400" b="0" i="0" u="none" strike="noStrike" cap="none">
+    <a:lvl6pPr marL="2286000" algn="l" defTabSz="914400" rtl="0" eaLnBrk="1" latinLnBrk="0" hangingPunct="1">
+      <a:defRPr sz="1800" kern="1200">
         <a:solidFill>
-          <a:srgbClr val="000000"/>
+          <a:schemeClr val="tx1"/>
         </a:solidFill>
-        <a:latin typeface="Arial"/>
-        <a:ea typeface="Arial"/>
-        <a:cs typeface="Arial"/>
-        <a:sym typeface="Arial"/>
+        <a:latin typeface="+mn-lt"/>
+        <a:ea typeface="+mn-ea"/>
+        <a:cs typeface="+mn-cs"/>
       </a:defRPr>
     </a:lvl6pPr>
-    <a:lvl7pPr marR="0" lvl="6" algn="l" rtl="0">
-      <a:lnSpc>
-        <a:spcPct val="100000"/>
-      </a:lnSpc>
-      <a:spcBef>
-        <a:spcPts val="0"/>
-      </a:spcBef>
-      <a:spcAft>
-        <a:spcPts val="0"/>
-      </a:spcAft>
-      <a:buClr>
-        <a:srgbClr val="000000"/>
-      </a:buClr>
-      <a:buFont typeface="Arial"/>
-      <a:defRPr sz="1400" b="0" i="0" u="none" strike="noStrike" cap="none">
+    <a:lvl7pPr marL="2743200" algn="l" defTabSz="914400" rtl="0" eaLnBrk="1" latinLnBrk="0" hangingPunct="1">
+      <a:defRPr sz="1800" kern="1200">
         <a:solidFill>
-          <a:srgbClr val="000000"/>
+          <a:schemeClr val="tx1"/>
         </a:solidFill>
-        <a:latin typeface="Arial"/>
-        <a:ea typeface="Arial"/>
-        <a:cs typeface="Arial"/>
-        <a:sym typeface="Arial"/>
+        <a:latin typeface="+mn-lt"/>
+        <a:ea typeface="+mn-ea"/>
+        <a:cs typeface="+mn-cs"/>
       </a:defRPr>
     </a:lvl7pPr>
-    <a:lvl8pPr marR="0" lvl="7" algn="l" rtl="0">
-      <a:lnSpc>
-        <a:spcPct val="100000"/>
-      </a:lnSpc>
-      <a:spcBef>
-        <a:spcPts val="0"/>
-      </a:spcBef>
-      <a:spcAft>
-        <a:spcPts val="0"/>
-      </a:spcAft>
-      <a:buClr>
-        <a:srgbClr val="000000"/>
-      </a:buClr>
-      <a:buFont typeface="Arial"/>
-      <a:defRPr sz="1400" b="0" i="0" u="none" strike="noStrike" cap="none">
+    <a:lvl8pPr marL="3200400" algn="l" defTabSz="914400" rtl="0" eaLnBrk="1" latinLnBrk="0" hangingPunct="1">
+      <a:defRPr sz="1800" kern="1200">
         <a:solidFill>
-          <a:srgbClr val="000000"/>
+          <a:schemeClr val="tx1"/>
         </a:solidFill>
-        <a:latin typeface="Arial"/>
-        <a:ea typeface="Arial"/>
-        <a:cs typeface="Arial"/>
-        <a:sym typeface="Arial"/>
+        <a:latin typeface="+mn-lt"/>
+        <a:ea typeface="+mn-ea"/>
+        <a:cs typeface="+mn-cs"/>
       </a:defRPr>
     </a:lvl8pPr>
-    <a:lvl9pPr marR="0" lvl="8" algn="l" rtl="0">
-      <a:lnSpc>
-        <a:spcPct val="100000"/>
-      </a:lnSpc>
-      <a:spcBef>
-        <a:spcPts val="0"/>
-      </a:spcBef>
-      <a:spcAft>
-        <a:spcPts val="0"/>
-      </a:spcAft>
-      <a:buClr>
-        <a:srgbClr val="000000"/>
-      </a:buClr>
-      <a:buFont typeface="Arial"/>
-      <a:defRPr sz="1400" b="0" i="0" u="none" strike="noStrike" cap="none">
+    <a:lvl9pPr marL="3657600" algn="l" defTabSz="914400" rtl="0" eaLnBrk="1" latinLnBrk="0" hangingPunct="1">
+      <a:defRPr sz="1800" kern="1200">
         <a:solidFill>
-          <a:srgbClr val="000000"/>
+          <a:schemeClr val="tx1"/>
         </a:solidFill>
-        <a:latin typeface="Arial"/>
-        <a:ea typeface="Arial"/>
-        <a:cs typeface="Arial"/>
-        <a:sym typeface="Arial"/>
+        <a:latin typeface="+mn-lt"/>
+        <a:ea typeface="+mn-ea"/>
+        <a:cs typeface="+mn-cs"/>
       </a:defRPr>
     </a:lvl9pPr>
   </p:defaultTextStyle>
@@ -258,23 +124,8 @@
     <p:ext uri="{EFAFB233-063F-42B5-8137-9DF3F51BA10A}">
       <p15:sldGuideLst xmlns:p15="http://schemas.microsoft.com/office/powerpoint/2012/main"/>
     </p:ext>
-    <p:ext uri="http://customooxmlschemas.google.com/">
-      <go:slidesCustomData xmlns:go="http://customooxmlschemas.google.com/" xmlns:p15="http://schemas.microsoft.com/office/powerpoint/2012/main" xmlns:p14="http://schemas.microsoft.com/office/powerpoint/2010/main" xmlns:com="http://schemas.openxmlformats.org/drawingml/2006/compatibility" xmlns:pvml="urn:schemas-microsoft-com:office:powerpoint" xmlns:v="urn:schemas-microsoft-com:vml" xmlns:o="urn:schemas-microsoft-com:office:office" xmlns:dgm="http://schemas.openxmlformats.org/drawingml/2006/diagram" xmlns:c="http://schemas.openxmlformats.org/drawingml/2006/chart" xmlns:mv="urn:schemas-microsoft-com:mac:vml" xmlns:mc="http://schemas.openxmlformats.org/markup-compatibility/2006" xmlns="" r:id="rId17" roundtripDataSignature="AMtx7mhcB0blr/SQn/d9pBN/m19CWvRtWQ=="/>
-    </p:ext>
   </p:extLst>
 </p:presentation>
-</file>
-
-<file path=ppt/commentAuthors.xml><?xml version="1.0" encoding="utf-8"?>
-<p:cmAuthorLst xmlns:a="http://schemas.openxmlformats.org/drawingml/2006/main" xmlns:r="http://schemas.openxmlformats.org/officeDocument/2006/relationships" xmlns:p="http://schemas.openxmlformats.org/presentationml/2006/main">
-  <p:cmAuthor id="1" name="Mahdi Jaberzadeh Ansari" initials="MJA" lastIdx="1" clrIdx="0">
-    <p:extLst>
-      <p:ext uri="{19B8F6BF-5375-455C-9EA6-DF929625EA0E}">
-        <p15:presenceInfo xmlns:p15="http://schemas.microsoft.com/office/powerpoint/2012/main" userId="S::mansari@AD.CIMT.DE::7eb0f391-2ea5-4fe7-b9f8-fd5a8e0690a4" providerId="AD"/>
-      </p:ext>
-    </p:extLst>
-  </p:cmAuthor>
-</p:cmAuthorLst>
 </file>
 
 <file path=ppt/notesMasters/notesMaster1.xml><?xml version="1.0" encoding="utf-8"?>
@@ -287,7 +138,7 @@
     </p:bg>
     <p:spTree>
       <p:nvGrpSpPr>
-        <p:cNvPr id="1" name="Shape 2"/>
+        <p:cNvPr id="1" name=""/>
         <p:cNvGrpSpPr/>
         <p:nvPr/>
       </p:nvGrpSpPr>
@@ -301,7 +152,73 @@
       </p:grpSpPr>
       <p:sp>
         <p:nvSpPr>
-          <p:cNvPr id="3" name="Google Shape;3;n"/>
+          <p:cNvPr id="2" name="Header Placeholder 1"/>
+          <p:cNvSpPr>
+            <a:spLocks noGrp="1"/>
+          </p:cNvSpPr>
+          <p:nvPr>
+            <p:ph type="hdr" sz="quarter"/>
+          </p:nvPr>
+        </p:nvSpPr>
+        <p:spPr>
+          <a:xfrm>
+            <a:off x="0" y="0"/>
+            <a:ext cx="2971800" cy="458788"/>
+          </a:xfrm>
+          <a:prstGeom prst="rect">
+            <a:avLst/>
+          </a:prstGeom>
+        </p:spPr>
+        <p:txBody>
+          <a:bodyPr vert="horz" lIns="91440" tIns="45720" rIns="91440" bIns="45720" rtlCol="0"/>
+          <a:lstStyle>
+            <a:lvl1pPr algn="l">
+              <a:defRPr sz="1200"/>
+            </a:lvl1pPr>
+          </a:lstStyle>
+          <a:p>
+            <a:endParaRPr lang="en-US"/>
+          </a:p>
+        </p:txBody>
+      </p:sp>
+      <p:sp>
+        <p:nvSpPr>
+          <p:cNvPr id="3" name="Date Placeholder 2"/>
+          <p:cNvSpPr>
+            <a:spLocks noGrp="1"/>
+          </p:cNvSpPr>
+          <p:nvPr>
+            <p:ph type="dt" idx="1"/>
+          </p:nvPr>
+        </p:nvSpPr>
+        <p:spPr>
+          <a:xfrm>
+            <a:off x="3884613" y="0"/>
+            <a:ext cx="2971800" cy="458788"/>
+          </a:xfrm>
+          <a:prstGeom prst="rect">
+            <a:avLst/>
+          </a:prstGeom>
+        </p:spPr>
+        <p:txBody>
+          <a:bodyPr vert="horz" lIns="91440" tIns="45720" rIns="91440" bIns="45720" rtlCol="0"/>
+          <a:lstStyle>
+            <a:lvl1pPr algn="r">
+              <a:defRPr sz="1200"/>
+            </a:lvl1pPr>
+          </a:lstStyle>
+          <a:p>
+            <a:fld id="{6EDF413B-3C80-442F-A024-5988AFEDA08C}" type="datetimeFigureOut">
+              <a:rPr lang="en-US" smtClean="0"/>
+              <a:t>2020-03-09</a:t>
+            </a:fld>
+            <a:endParaRPr lang="en-US"/>
+          </a:p>
+        </p:txBody>
+      </p:sp>
+      <p:sp>
+        <p:nvSpPr>
+          <p:cNvPr id="4" name="Slide Image Placeholder 3"/>
           <p:cNvSpPr>
             <a:spLocks noGrp="1" noRot="1" noChangeAspect="1"/>
           </p:cNvSpPr>
@@ -311,407 +228,249 @@
         </p:nvSpPr>
         <p:spPr>
           <a:xfrm>
-            <a:off x="1143225" y="685800"/>
-            <a:ext cx="4572225" cy="3429000"/>
-          </a:xfrm>
-          <a:custGeom>
-            <a:avLst/>
-            <a:gdLst/>
-            <a:ahLst/>
-            <a:cxnLst/>
-            <a:rect l="l" t="t" r="r" b="b"/>
-            <a:pathLst>
-              <a:path w="120000" h="120000" extrusionOk="0">
-                <a:moveTo>
-                  <a:pt x="0" y="0"/>
-                </a:moveTo>
-                <a:lnTo>
-                  <a:pt x="120000" y="0"/>
-                </a:lnTo>
-                <a:lnTo>
-                  <a:pt x="120000" y="120000"/>
-                </a:lnTo>
-                <a:lnTo>
-                  <a:pt x="0" y="120000"/>
-                </a:lnTo>
-                <a:close/>
-              </a:path>
-            </a:pathLst>
-          </a:custGeom>
-          <a:noFill/>
-          <a:ln w="9525" cap="flat" cmpd="sng">
-            <a:solidFill>
-              <a:srgbClr val="000000"/>
-            </a:solidFill>
-            <a:prstDash val="solid"/>
-            <a:round/>
-            <a:headEnd type="none" w="sm" len="sm"/>
-            <a:tailEnd type="none" w="sm" len="sm"/>
-          </a:ln>
-        </p:spPr>
-      </p:sp>
-      <p:sp>
-        <p:nvSpPr>
-          <p:cNvPr id="4" name="Google Shape;4;n"/>
-          <p:cNvSpPr txBox="1">
-            <a:spLocks noGrp="1"/>
-          </p:cNvSpPr>
-          <p:nvPr>
-            <p:ph type="body" idx="1"/>
-          </p:nvPr>
-        </p:nvSpPr>
-        <p:spPr>
-          <a:xfrm>
-            <a:off x="685800" y="4343400"/>
-            <a:ext cx="5486400" cy="4114800"/>
+            <a:off x="685800" y="1143000"/>
+            <a:ext cx="5486400" cy="3086100"/>
           </a:xfrm>
           <a:prstGeom prst="rect">
             <a:avLst/>
           </a:prstGeom>
           <a:noFill/>
-          <a:ln>
-            <a:noFill/>
+          <a:ln w="12700">
+            <a:solidFill>
+              <a:prstClr val="black"/>
+            </a:solidFill>
           </a:ln>
         </p:spPr>
         <p:txBody>
-          <a:bodyPr spcFirstLastPara="1" wrap="square" lIns="91425" tIns="91425" rIns="91425" bIns="91425" anchor="t" anchorCtr="0">
-            <a:noAutofit/>
-          </a:bodyPr>
+          <a:bodyPr vert="horz" lIns="91440" tIns="45720" rIns="91440" bIns="45720" rtlCol="0" anchor="ctr"/>
+          <a:lstStyle/>
+          <a:p>
+            <a:endParaRPr lang="en-US"/>
+          </a:p>
+        </p:txBody>
+      </p:sp>
+      <p:sp>
+        <p:nvSpPr>
+          <p:cNvPr id="5" name="Notes Placeholder 4"/>
+          <p:cNvSpPr>
+            <a:spLocks noGrp="1"/>
+          </p:cNvSpPr>
+          <p:nvPr>
+            <p:ph type="body" sz="quarter" idx="3"/>
+          </p:nvPr>
+        </p:nvSpPr>
+        <p:spPr>
+          <a:xfrm>
+            <a:off x="685800" y="4400550"/>
+            <a:ext cx="5486400" cy="3600450"/>
+          </a:xfrm>
+          <a:prstGeom prst="rect">
+            <a:avLst/>
+          </a:prstGeom>
+        </p:spPr>
+        <p:txBody>
+          <a:bodyPr vert="horz" lIns="91440" tIns="45720" rIns="91440" bIns="45720" rtlCol="0"/>
+          <a:lstStyle/>
+          <a:p>
+            <a:pPr lvl="0"/>
+            <a:r>
+              <a:rPr lang="en-US"/>
+              <a:t>Click to edit Master text styles</a:t>
+            </a:r>
+          </a:p>
+          <a:p>
+            <a:pPr lvl="1"/>
+            <a:r>
+              <a:rPr lang="en-US"/>
+              <a:t>Second level</a:t>
+            </a:r>
+          </a:p>
+          <a:p>
+            <a:pPr lvl="2"/>
+            <a:r>
+              <a:rPr lang="en-US"/>
+              <a:t>Third level</a:t>
+            </a:r>
+          </a:p>
+          <a:p>
+            <a:pPr lvl="3"/>
+            <a:r>
+              <a:rPr lang="en-US"/>
+              <a:t>Fourth level</a:t>
+            </a:r>
+          </a:p>
+          <a:p>
+            <a:pPr lvl="4"/>
+            <a:r>
+              <a:rPr lang="en-US"/>
+              <a:t>Fifth level</a:t>
+            </a:r>
+          </a:p>
+        </p:txBody>
+      </p:sp>
+      <p:sp>
+        <p:nvSpPr>
+          <p:cNvPr id="6" name="Footer Placeholder 5"/>
+          <p:cNvSpPr>
+            <a:spLocks noGrp="1"/>
+          </p:cNvSpPr>
+          <p:nvPr>
+            <p:ph type="ftr" sz="quarter" idx="4"/>
+          </p:nvPr>
+        </p:nvSpPr>
+        <p:spPr>
+          <a:xfrm>
+            <a:off x="0" y="8685213"/>
+            <a:ext cx="2971800" cy="458787"/>
+          </a:xfrm>
+          <a:prstGeom prst="rect">
+            <a:avLst/>
+          </a:prstGeom>
+        </p:spPr>
+        <p:txBody>
+          <a:bodyPr vert="horz" lIns="91440" tIns="45720" rIns="91440" bIns="45720" rtlCol="0" anchor="b"/>
           <a:lstStyle>
-            <a:lvl1pPr marL="457200" lvl="0" indent="-298450">
-              <a:spcBef>
-                <a:spcPts val="0"/>
-              </a:spcBef>
-              <a:spcAft>
-                <a:spcPts val="0"/>
-              </a:spcAft>
-              <a:buSzPts val="1100"/>
-              <a:buChar char="●"/>
-              <a:defRPr sz="1100"/>
+            <a:lvl1pPr algn="l">
+              <a:defRPr sz="1200"/>
             </a:lvl1pPr>
-            <a:lvl2pPr marL="914400" lvl="1" indent="-298450">
-              <a:spcBef>
-                <a:spcPts val="0"/>
-              </a:spcBef>
-              <a:spcAft>
-                <a:spcPts val="0"/>
-              </a:spcAft>
-              <a:buSzPts val="1100"/>
-              <a:buChar char="○"/>
-              <a:defRPr sz="1100"/>
-            </a:lvl2pPr>
-            <a:lvl3pPr marL="1371600" lvl="2" indent="-298450">
-              <a:spcBef>
-                <a:spcPts val="0"/>
-              </a:spcBef>
-              <a:spcAft>
-                <a:spcPts val="0"/>
-              </a:spcAft>
-              <a:buSzPts val="1100"/>
-              <a:buChar char="■"/>
-              <a:defRPr sz="1100"/>
-            </a:lvl3pPr>
-            <a:lvl4pPr marL="1828800" lvl="3" indent="-298450">
-              <a:spcBef>
-                <a:spcPts val="0"/>
-              </a:spcBef>
-              <a:spcAft>
-                <a:spcPts val="0"/>
-              </a:spcAft>
-              <a:buSzPts val="1100"/>
-              <a:buChar char="●"/>
-              <a:defRPr sz="1100"/>
-            </a:lvl4pPr>
-            <a:lvl5pPr marL="2286000" lvl="4" indent="-298450">
-              <a:spcBef>
-                <a:spcPts val="0"/>
-              </a:spcBef>
-              <a:spcAft>
-                <a:spcPts val="0"/>
-              </a:spcAft>
-              <a:buSzPts val="1100"/>
-              <a:buChar char="○"/>
-              <a:defRPr sz="1100"/>
-            </a:lvl5pPr>
-            <a:lvl6pPr marL="2743200" lvl="5" indent="-298450">
-              <a:spcBef>
-                <a:spcPts val="0"/>
-              </a:spcBef>
-              <a:spcAft>
-                <a:spcPts val="0"/>
-              </a:spcAft>
-              <a:buSzPts val="1100"/>
-              <a:buChar char="■"/>
-              <a:defRPr sz="1100"/>
-            </a:lvl6pPr>
-            <a:lvl7pPr marL="3200400" lvl="6" indent="-298450">
-              <a:spcBef>
-                <a:spcPts val="0"/>
-              </a:spcBef>
-              <a:spcAft>
-                <a:spcPts val="0"/>
-              </a:spcAft>
-              <a:buSzPts val="1100"/>
-              <a:buChar char="●"/>
-              <a:defRPr sz="1100"/>
-            </a:lvl7pPr>
-            <a:lvl8pPr marL="3657600" lvl="7" indent="-298450">
-              <a:spcBef>
-                <a:spcPts val="0"/>
-              </a:spcBef>
-              <a:spcAft>
-                <a:spcPts val="0"/>
-              </a:spcAft>
-              <a:buSzPts val="1100"/>
-              <a:buChar char="○"/>
-              <a:defRPr sz="1100"/>
-            </a:lvl8pPr>
-            <a:lvl9pPr marL="4114800" lvl="8" indent="-298450">
-              <a:spcBef>
-                <a:spcPts val="0"/>
-              </a:spcBef>
-              <a:spcAft>
-                <a:spcPts val="0"/>
-              </a:spcAft>
-              <a:buSzPts val="1100"/>
-              <a:buChar char="■"/>
-              <a:defRPr sz="1100"/>
-            </a:lvl9pPr>
           </a:lstStyle>
           <a:p>
-            <a:endParaRPr/>
+            <a:endParaRPr lang="en-US"/>
+          </a:p>
+        </p:txBody>
+      </p:sp>
+      <p:sp>
+        <p:nvSpPr>
+          <p:cNvPr id="7" name="Slide Number Placeholder 6"/>
+          <p:cNvSpPr>
+            <a:spLocks noGrp="1"/>
+          </p:cNvSpPr>
+          <p:nvPr>
+            <p:ph type="sldNum" sz="quarter" idx="5"/>
+          </p:nvPr>
+        </p:nvSpPr>
+        <p:spPr>
+          <a:xfrm>
+            <a:off x="3884613" y="8685213"/>
+            <a:ext cx="2971800" cy="458787"/>
+          </a:xfrm>
+          <a:prstGeom prst="rect">
+            <a:avLst/>
+          </a:prstGeom>
+        </p:spPr>
+        <p:txBody>
+          <a:bodyPr vert="horz" lIns="91440" tIns="45720" rIns="91440" bIns="45720" rtlCol="0" anchor="b"/>
+          <a:lstStyle>
+            <a:lvl1pPr algn="r">
+              <a:defRPr sz="1200"/>
+            </a:lvl1pPr>
+          </a:lstStyle>
+          <a:p>
+            <a:fld id="{621B439C-AE8B-4FBA-AE7B-53C747D71826}" type="slidenum">
+              <a:rPr lang="en-US" smtClean="0"/>
+              <a:t>‹#›</a:t>
+            </a:fld>
+            <a:endParaRPr lang="en-US"/>
           </a:p>
         </p:txBody>
       </p:sp>
     </p:spTree>
+    <p:extLst>
+      <p:ext uri="{BB962C8B-B14F-4D97-AF65-F5344CB8AC3E}">
+        <p14:creationId xmlns:p14="http://schemas.microsoft.com/office/powerpoint/2010/main" val="824746780"/>
+      </p:ext>
+    </p:extLst>
   </p:cSld>
-  <p:clrMap bg1="lt1" tx1="dk1" bg2="dk2" tx2="lt2" accent1="accent1" accent2="accent2" accent3="accent3" accent4="accent4" accent5="accent5" accent6="accent6" hlink="hlink" folHlink="folHlink"/>
+  <p:clrMap bg1="lt1" tx1="dk1" bg2="lt2" tx2="dk2" accent1="accent1" accent2="accent2" accent3="accent3" accent4="accent4" accent5="accent5" accent6="accent6" hlink="hlink" folHlink="folHlink"/>
   <p:notesStyle>
-    <a:defPPr marR="0" lvl="0" algn="l" rtl="0">
-      <a:lnSpc>
-        <a:spcPct val="100000"/>
-      </a:lnSpc>
-      <a:spcBef>
-        <a:spcPts val="0"/>
-      </a:spcBef>
-      <a:spcAft>
-        <a:spcPts val="0"/>
-      </a:spcAft>
-    </a:defPPr>
-    <a:lvl1pPr marR="0" lvl="0" algn="l" rtl="0">
-      <a:lnSpc>
-        <a:spcPct val="100000"/>
-      </a:lnSpc>
-      <a:spcBef>
-        <a:spcPts val="0"/>
-      </a:spcBef>
-      <a:spcAft>
-        <a:spcPts val="0"/>
-      </a:spcAft>
-      <a:buClr>
-        <a:srgbClr val="000000"/>
-      </a:buClr>
-      <a:buFont typeface="Arial"/>
-      <a:defRPr sz="1400" b="0" i="0" u="none" strike="noStrike" cap="none">
+    <a:lvl1pPr marL="0" algn="l" defTabSz="914400" rtl="0" eaLnBrk="1" latinLnBrk="0" hangingPunct="1">
+      <a:defRPr sz="1200" kern="1200">
         <a:solidFill>
-          <a:srgbClr val="000000"/>
+          <a:schemeClr val="tx1"/>
         </a:solidFill>
-        <a:latin typeface="Arial"/>
-        <a:ea typeface="Arial"/>
-        <a:cs typeface="Arial"/>
-        <a:sym typeface="Arial"/>
+        <a:latin typeface="+mn-lt"/>
+        <a:ea typeface="+mn-ea"/>
+        <a:cs typeface="+mn-cs"/>
       </a:defRPr>
     </a:lvl1pPr>
-    <a:lvl2pPr marR="0" lvl="1" algn="l" rtl="0">
-      <a:lnSpc>
-        <a:spcPct val="100000"/>
-      </a:lnSpc>
-      <a:spcBef>
-        <a:spcPts val="0"/>
-      </a:spcBef>
-      <a:spcAft>
-        <a:spcPts val="0"/>
-      </a:spcAft>
-      <a:buClr>
-        <a:srgbClr val="000000"/>
-      </a:buClr>
-      <a:buFont typeface="Arial"/>
-      <a:defRPr sz="1400" b="0" i="0" u="none" strike="noStrike" cap="none">
+    <a:lvl2pPr marL="457200" algn="l" defTabSz="914400" rtl="0" eaLnBrk="1" latinLnBrk="0" hangingPunct="1">
+      <a:defRPr sz="1200" kern="1200">
         <a:solidFill>
-          <a:srgbClr val="000000"/>
+          <a:schemeClr val="tx1"/>
         </a:solidFill>
-        <a:latin typeface="Arial"/>
-        <a:ea typeface="Arial"/>
-        <a:cs typeface="Arial"/>
-        <a:sym typeface="Arial"/>
+        <a:latin typeface="+mn-lt"/>
+        <a:ea typeface="+mn-ea"/>
+        <a:cs typeface="+mn-cs"/>
       </a:defRPr>
     </a:lvl2pPr>
-    <a:lvl3pPr marR="0" lvl="2" algn="l" rtl="0">
-      <a:lnSpc>
-        <a:spcPct val="100000"/>
-      </a:lnSpc>
-      <a:spcBef>
-        <a:spcPts val="0"/>
-      </a:spcBef>
-      <a:spcAft>
-        <a:spcPts val="0"/>
-      </a:spcAft>
-      <a:buClr>
-        <a:srgbClr val="000000"/>
-      </a:buClr>
-      <a:buFont typeface="Arial"/>
-      <a:defRPr sz="1400" b="0" i="0" u="none" strike="noStrike" cap="none">
+    <a:lvl3pPr marL="914400" algn="l" defTabSz="914400" rtl="0" eaLnBrk="1" latinLnBrk="0" hangingPunct="1">
+      <a:defRPr sz="1200" kern="1200">
         <a:solidFill>
-          <a:srgbClr val="000000"/>
+          <a:schemeClr val="tx1"/>
         </a:solidFill>
-        <a:latin typeface="Arial"/>
-        <a:ea typeface="Arial"/>
-        <a:cs typeface="Arial"/>
-        <a:sym typeface="Arial"/>
+        <a:latin typeface="+mn-lt"/>
+        <a:ea typeface="+mn-ea"/>
+        <a:cs typeface="+mn-cs"/>
       </a:defRPr>
     </a:lvl3pPr>
-    <a:lvl4pPr marR="0" lvl="3" algn="l" rtl="0">
-      <a:lnSpc>
-        <a:spcPct val="100000"/>
-      </a:lnSpc>
-      <a:spcBef>
-        <a:spcPts val="0"/>
-      </a:spcBef>
-      <a:spcAft>
-        <a:spcPts val="0"/>
-      </a:spcAft>
-      <a:buClr>
-        <a:srgbClr val="000000"/>
-      </a:buClr>
-      <a:buFont typeface="Arial"/>
-      <a:defRPr sz="1400" b="0" i="0" u="none" strike="noStrike" cap="none">
+    <a:lvl4pPr marL="1371600" algn="l" defTabSz="914400" rtl="0" eaLnBrk="1" latinLnBrk="0" hangingPunct="1">
+      <a:defRPr sz="1200" kern="1200">
         <a:solidFill>
-          <a:srgbClr val="000000"/>
+          <a:schemeClr val="tx1"/>
         </a:solidFill>
-        <a:latin typeface="Arial"/>
-        <a:ea typeface="Arial"/>
-        <a:cs typeface="Arial"/>
-        <a:sym typeface="Arial"/>
+        <a:latin typeface="+mn-lt"/>
+        <a:ea typeface="+mn-ea"/>
+        <a:cs typeface="+mn-cs"/>
       </a:defRPr>
     </a:lvl4pPr>
-    <a:lvl5pPr marR="0" lvl="4" algn="l" rtl="0">
-      <a:lnSpc>
-        <a:spcPct val="100000"/>
-      </a:lnSpc>
-      <a:spcBef>
-        <a:spcPts val="0"/>
-      </a:spcBef>
-      <a:spcAft>
-        <a:spcPts val="0"/>
-      </a:spcAft>
-      <a:buClr>
-        <a:srgbClr val="000000"/>
-      </a:buClr>
-      <a:buFont typeface="Arial"/>
-      <a:defRPr sz="1400" b="0" i="0" u="none" strike="noStrike" cap="none">
+    <a:lvl5pPr marL="1828800" algn="l" defTabSz="914400" rtl="0" eaLnBrk="1" latinLnBrk="0" hangingPunct="1">
+      <a:defRPr sz="1200" kern="1200">
         <a:solidFill>
-          <a:srgbClr val="000000"/>
+          <a:schemeClr val="tx1"/>
         </a:solidFill>
-        <a:latin typeface="Arial"/>
-        <a:ea typeface="Arial"/>
-        <a:cs typeface="Arial"/>
-        <a:sym typeface="Arial"/>
+        <a:latin typeface="+mn-lt"/>
+        <a:ea typeface="+mn-ea"/>
+        <a:cs typeface="+mn-cs"/>
       </a:defRPr>
     </a:lvl5pPr>
-    <a:lvl6pPr marR="0" lvl="5" algn="l" rtl="0">
-      <a:lnSpc>
-        <a:spcPct val="100000"/>
-      </a:lnSpc>
-      <a:spcBef>
-        <a:spcPts val="0"/>
-      </a:spcBef>
-      <a:spcAft>
-        <a:spcPts val="0"/>
-      </a:spcAft>
-      <a:buClr>
-        <a:srgbClr val="000000"/>
-      </a:buClr>
-      <a:buFont typeface="Arial"/>
-      <a:defRPr sz="1400" b="0" i="0" u="none" strike="noStrike" cap="none">
+    <a:lvl6pPr marL="2286000" algn="l" defTabSz="914400" rtl="0" eaLnBrk="1" latinLnBrk="0" hangingPunct="1">
+      <a:defRPr sz="1200" kern="1200">
         <a:solidFill>
-          <a:srgbClr val="000000"/>
+          <a:schemeClr val="tx1"/>
         </a:solidFill>
-        <a:latin typeface="Arial"/>
-        <a:ea typeface="Arial"/>
-        <a:cs typeface="Arial"/>
-        <a:sym typeface="Arial"/>
+        <a:latin typeface="+mn-lt"/>
+        <a:ea typeface="+mn-ea"/>
+        <a:cs typeface="+mn-cs"/>
       </a:defRPr>
     </a:lvl6pPr>
-    <a:lvl7pPr marR="0" lvl="6" algn="l" rtl="0">
-      <a:lnSpc>
-        <a:spcPct val="100000"/>
-      </a:lnSpc>
-      <a:spcBef>
-        <a:spcPts val="0"/>
-      </a:spcBef>
-      <a:spcAft>
-        <a:spcPts val="0"/>
-      </a:spcAft>
-      <a:buClr>
-        <a:srgbClr val="000000"/>
-      </a:buClr>
-      <a:buFont typeface="Arial"/>
-      <a:defRPr sz="1400" b="0" i="0" u="none" strike="noStrike" cap="none">
+    <a:lvl7pPr marL="2743200" algn="l" defTabSz="914400" rtl="0" eaLnBrk="1" latinLnBrk="0" hangingPunct="1">
+      <a:defRPr sz="1200" kern="1200">
         <a:solidFill>
-          <a:srgbClr val="000000"/>
+          <a:schemeClr val="tx1"/>
         </a:solidFill>
-        <a:latin typeface="Arial"/>
-        <a:ea typeface="Arial"/>
-        <a:cs typeface="Arial"/>
-        <a:sym typeface="Arial"/>
+        <a:latin typeface="+mn-lt"/>
+        <a:ea typeface="+mn-ea"/>
+        <a:cs typeface="+mn-cs"/>
       </a:defRPr>
     </a:lvl7pPr>
-    <a:lvl8pPr marR="0" lvl="7" algn="l" rtl="0">
-      <a:lnSpc>
-        <a:spcPct val="100000"/>
-      </a:lnSpc>
-      <a:spcBef>
-        <a:spcPts val="0"/>
-      </a:spcBef>
-      <a:spcAft>
-        <a:spcPts val="0"/>
-      </a:spcAft>
-      <a:buClr>
-        <a:srgbClr val="000000"/>
-      </a:buClr>
-      <a:buFont typeface="Arial"/>
-      <a:defRPr sz="1400" b="0" i="0" u="none" strike="noStrike" cap="none">
+    <a:lvl8pPr marL="3200400" algn="l" defTabSz="914400" rtl="0" eaLnBrk="1" latinLnBrk="0" hangingPunct="1">
+      <a:defRPr sz="1200" kern="1200">
         <a:solidFill>
-          <a:srgbClr val="000000"/>
+          <a:schemeClr val="tx1"/>
         </a:solidFill>
-        <a:latin typeface="Arial"/>
-        <a:ea typeface="Arial"/>
-        <a:cs typeface="Arial"/>
-        <a:sym typeface="Arial"/>
+        <a:latin typeface="+mn-lt"/>
+        <a:ea typeface="+mn-ea"/>
+        <a:cs typeface="+mn-cs"/>
       </a:defRPr>
     </a:lvl8pPr>
-    <a:lvl9pPr marR="0" lvl="8" algn="l" rtl="0">
-      <a:lnSpc>
-        <a:spcPct val="100000"/>
-      </a:lnSpc>
-      <a:spcBef>
-        <a:spcPts val="0"/>
-      </a:spcBef>
-      <a:spcAft>
-        <a:spcPts val="0"/>
-      </a:spcAft>
-      <a:buClr>
-        <a:srgbClr val="000000"/>
-      </a:buClr>
-      <a:buFont typeface="Arial"/>
-      <a:defRPr sz="1400" b="0" i="0" u="none" strike="noStrike" cap="none">
+    <a:lvl9pPr marL="3657600" algn="l" defTabSz="914400" rtl="0" eaLnBrk="1" latinLnBrk="0" hangingPunct="1">
+      <a:defRPr sz="1200" kern="1200">
         <a:solidFill>
-          <a:srgbClr val="000000"/>
+          <a:schemeClr val="tx1"/>
         </a:solidFill>
-        <a:latin typeface="Arial"/>
-        <a:ea typeface="Arial"/>
-        <a:cs typeface="Arial"/>
-        <a:sym typeface="Arial"/>
+        <a:latin typeface="+mn-lt"/>
+        <a:ea typeface="+mn-ea"/>
+        <a:cs typeface="+mn-cs"/>
       </a:defRPr>
     </a:lvl9pPr>
   </p:notesStyle>
@@ -723,7 +482,7 @@
   <p:cSld>
     <p:spTree>
       <p:nvGrpSpPr>
-        <p:cNvPr id="1" name="Shape 90"/>
+        <p:cNvPr id="1" name="Shape 100"/>
         <p:cNvGrpSpPr/>
         <p:nvPr/>
       </p:nvGrpSpPr>
@@ -737,7 +496,7 @@
       </p:grpSpPr>
       <p:sp>
         <p:nvSpPr>
-          <p:cNvPr id="91" name="Google Shape;91;p1:notes"/>
+          <p:cNvPr id="101" name="Google Shape;101;p2:notes"/>
           <p:cNvSpPr txBox="1">
             <a:spLocks noGrp="1"/>
           </p:cNvSpPr>
@@ -769,13 +528,13 @@
               </a:spcAft>
               <a:buNone/>
             </a:pPr>
-            <a:endParaRPr dirty="0"/>
+            <a:endParaRPr/>
           </a:p>
         </p:txBody>
       </p:sp>
       <p:sp>
         <p:nvSpPr>
-          <p:cNvPr id="92" name="Google Shape;92;p1:notes"/>
+          <p:cNvPr id="102" name="Google Shape;102;p2:notes"/>
           <p:cNvSpPr>
             <a:spLocks noGrp="1" noRot="1" noChangeAspect="1"/>
           </p:cNvSpPr>
@@ -827,7 +586,7 @@
   <p:cSld>
     <p:spTree>
       <p:nvGrpSpPr>
-        <p:cNvPr id="1" name="Shape 100"/>
+        <p:cNvPr id="1" name="Shape 110"/>
         <p:cNvGrpSpPr/>
         <p:nvPr/>
       </p:nvGrpSpPr>
@@ -841,7 +600,7 @@
       </p:grpSpPr>
       <p:sp>
         <p:nvSpPr>
-          <p:cNvPr id="101" name="Google Shape;101;p2:notes"/>
+          <p:cNvPr id="111" name="Google Shape;111;p3:notes"/>
           <p:cNvSpPr txBox="1">
             <a:spLocks noGrp="1"/>
           </p:cNvSpPr>
@@ -879,7 +638,7 @@
       </p:sp>
       <p:sp>
         <p:nvSpPr>
-          <p:cNvPr id="102" name="Google Shape;102;p2:notes"/>
+          <p:cNvPr id="112" name="Google Shape;112;p3:notes"/>
           <p:cNvSpPr>
             <a:spLocks noGrp="1" noRot="1" noChangeAspect="1"/>
           </p:cNvSpPr>
@@ -931,110 +690,6 @@
   <p:cSld>
     <p:spTree>
       <p:nvGrpSpPr>
-        <p:cNvPr id="1" name="Shape 110"/>
-        <p:cNvGrpSpPr/>
-        <p:nvPr/>
-      </p:nvGrpSpPr>
-      <p:grpSpPr>
-        <a:xfrm>
-          <a:off x="0" y="0"/>
-          <a:ext cx="0" cy="0"/>
-          <a:chOff x="0" y="0"/>
-          <a:chExt cx="0" cy="0"/>
-        </a:xfrm>
-      </p:grpSpPr>
-      <p:sp>
-        <p:nvSpPr>
-          <p:cNvPr id="111" name="Google Shape;111;p3:notes"/>
-          <p:cNvSpPr txBox="1">
-            <a:spLocks noGrp="1"/>
-          </p:cNvSpPr>
-          <p:nvPr>
-            <p:ph type="body" idx="1"/>
-          </p:nvPr>
-        </p:nvSpPr>
-        <p:spPr>
-          <a:xfrm>
-            <a:off x="685800" y="4343400"/>
-            <a:ext cx="5486400" cy="4114800"/>
-          </a:xfrm>
-          <a:prstGeom prst="rect">
-            <a:avLst/>
-          </a:prstGeom>
-        </p:spPr>
-        <p:txBody>
-          <a:bodyPr spcFirstLastPara="1" wrap="square" lIns="91425" tIns="91425" rIns="91425" bIns="91425" anchor="t" anchorCtr="0">
-            <a:noAutofit/>
-          </a:bodyPr>
-          <a:lstStyle/>
-          <a:p>
-            <a:pPr marL="0" lvl="0" indent="0" algn="l" rtl="0">
-              <a:spcBef>
-                <a:spcPts val="0"/>
-              </a:spcBef>
-              <a:spcAft>
-                <a:spcPts val="0"/>
-              </a:spcAft>
-              <a:buNone/>
-            </a:pPr>
-            <a:endParaRPr/>
-          </a:p>
-        </p:txBody>
-      </p:sp>
-      <p:sp>
-        <p:nvSpPr>
-          <p:cNvPr id="112" name="Google Shape;112;p3:notes"/>
-          <p:cNvSpPr>
-            <a:spLocks noGrp="1" noRot="1" noChangeAspect="1"/>
-          </p:cNvSpPr>
-          <p:nvPr>
-            <p:ph type="sldImg" idx="2"/>
-          </p:nvPr>
-        </p:nvSpPr>
-        <p:spPr>
-          <a:xfrm>
-            <a:off x="381000" y="685800"/>
-            <a:ext cx="6096000" cy="3429000"/>
-          </a:xfrm>
-          <a:custGeom>
-            <a:avLst/>
-            <a:gdLst/>
-            <a:ahLst/>
-            <a:cxnLst/>
-            <a:rect l="l" t="t" r="r" b="b"/>
-            <a:pathLst>
-              <a:path w="120000" h="120000" extrusionOk="0">
-                <a:moveTo>
-                  <a:pt x="0" y="0"/>
-                </a:moveTo>
-                <a:lnTo>
-                  <a:pt x="120000" y="0"/>
-                </a:lnTo>
-                <a:lnTo>
-                  <a:pt x="120000" y="120000"/>
-                </a:lnTo>
-                <a:lnTo>
-                  <a:pt x="0" y="120000"/>
-                </a:lnTo>
-                <a:close/>
-              </a:path>
-            </a:pathLst>
-          </a:custGeom>
-        </p:spPr>
-      </p:sp>
-    </p:spTree>
-  </p:cSld>
-  <p:clrMapOvr>
-    <a:masterClrMapping/>
-  </p:clrMapOvr>
-</p:notes>
-</file>
-
-<file path=ppt/notesSlides/notesSlide4.xml><?xml version="1.0" encoding="utf-8"?>
-<p:notes xmlns:a="http://schemas.openxmlformats.org/drawingml/2006/main" xmlns:r="http://schemas.openxmlformats.org/officeDocument/2006/relationships" xmlns:p="http://schemas.openxmlformats.org/presentationml/2006/main" showMasterSp="0" showMasterPhAnim="0">
-  <p:cSld>
-    <p:spTree>
-      <p:nvGrpSpPr>
         <p:cNvPr id="1" name="Shape 119"/>
         <p:cNvGrpSpPr/>
         <p:nvPr/>
@@ -1134,7 +789,7 @@
 </p:notes>
 </file>
 
-<file path=ppt/notesSlides/notesSlide5.xml><?xml version="1.0" encoding="utf-8"?>
+<file path=ppt/notesSlides/notesSlide4.xml><?xml version="1.0" encoding="utf-8"?>
 <p:notes xmlns:a="http://schemas.openxmlformats.org/drawingml/2006/main" xmlns:r="http://schemas.openxmlformats.org/officeDocument/2006/relationships" xmlns:p="http://schemas.openxmlformats.org/presentationml/2006/main">
   <p:cSld>
     <p:spTree>
@@ -1213,7 +868,7 @@
 </p:notes>
 </file>
 
-<file path=ppt/notesSlides/notesSlide6.xml><?xml version="1.0" encoding="utf-8"?>
+<file path=ppt/notesSlides/notesSlide5.xml><?xml version="1.0" encoding="utf-8"?>
 <p:notes xmlns:a="http://schemas.openxmlformats.org/drawingml/2006/main" xmlns:r="http://schemas.openxmlformats.org/officeDocument/2006/relationships" xmlns:p="http://schemas.openxmlformats.org/presentationml/2006/main" showMasterSp="0" showMasterPhAnim="0">
   <p:cSld>
     <p:spTree>
@@ -1317,7 +972,7 @@
 </p:notes>
 </file>
 
-<file path=ppt/notesSlides/notesSlide7.xml><?xml version="1.0" encoding="utf-8"?>
+<file path=ppt/notesSlides/notesSlide6.xml><?xml version="1.0" encoding="utf-8"?>
 <p:notes xmlns:a="http://schemas.openxmlformats.org/drawingml/2006/main" xmlns:r="http://schemas.openxmlformats.org/officeDocument/2006/relationships" xmlns:p="http://schemas.openxmlformats.org/presentationml/2006/main">
   <p:cSld>
     <p:spTree>
@@ -1605,8 +1260,8 @@
 </file>
 
 <file path=ppt/slideLayouts/slideLayout1.xml><?xml version="1.0" encoding="utf-8"?>
-<p:sldLayout xmlns:a="http://schemas.openxmlformats.org/drawingml/2006/main" xmlns:r="http://schemas.openxmlformats.org/officeDocument/2006/relationships" xmlns:p="http://schemas.openxmlformats.org/presentationml/2006/main" matchingName="Titelfolie" type="title">
-  <p:cSld name="TITLE">
+<p:sldLayout xmlns:a="http://schemas.openxmlformats.org/drawingml/2006/main" xmlns:r="http://schemas.openxmlformats.org/officeDocument/2006/relationships" xmlns:p="http://schemas.openxmlformats.org/presentationml/2006/main" matchingName="Titelfolie" type="title" preserve="1">
+  <p:cSld name="Titelfolie">
     <p:spTree>
       <p:nvGrpSpPr>
         <p:cNvPr id="1" name="Shape 14"/>
@@ -1761,6 +1416,10 @@
             </a:lvl9pPr>
           </a:lstStyle>
           <a:p>
+            <a:r>
+              <a:rPr lang="en-US"/>
+              <a:t>Click to edit Master title style</a:t>
+            </a:r>
             <a:endParaRPr/>
           </a:p>
         </p:txBody>
@@ -1952,6 +1611,10 @@
             </a:lvl9pPr>
           </a:lstStyle>
           <a:p>
+            <a:r>
+              <a:rPr lang="en-US"/>
+              <a:t>Click to edit Master subtitle style</a:t>
+            </a:r>
             <a:endParaRPr/>
           </a:p>
         </p:txBody>
@@ -2636,6 +2299,11 @@
         </p:sp>
       </p:grpSp>
     </p:spTree>
+    <p:extLst>
+      <p:ext uri="{BB962C8B-B14F-4D97-AF65-F5344CB8AC3E}">
+        <p14:creationId xmlns:p14="http://schemas.microsoft.com/office/powerpoint/2010/main" val="2438718293"/>
+      </p:ext>
+    </p:extLst>
   </p:cSld>
   <p:clrMapOvr>
     <a:masterClrMapping/>
@@ -2644,8 +2312,8 @@
 </file>
 
 <file path=ppt/slideLayouts/slideLayout10.xml><?xml version="1.0" encoding="utf-8"?>
-<p:sldLayout xmlns:a="http://schemas.openxmlformats.org/drawingml/2006/main" xmlns:r="http://schemas.openxmlformats.org/officeDocument/2006/relationships" xmlns:p="http://schemas.openxmlformats.org/presentationml/2006/main" matchingName="Titel und vertikaler Text" type="vertTx">
-  <p:cSld name="VERTICAL_TEXT">
+<p:sldLayout xmlns:a="http://schemas.openxmlformats.org/drawingml/2006/main" xmlns:r="http://schemas.openxmlformats.org/officeDocument/2006/relationships" xmlns:p="http://schemas.openxmlformats.org/presentationml/2006/main" matchingName="Titel und vertikaler Text" type="vertTx" preserve="1">
+  <p:cSld name="Titel und vertikaler Text">
     <p:spTree>
       <p:nvGrpSpPr>
         <p:cNvPr id="1" name="Shape 78"/>
@@ -2795,6 +2463,10 @@
             </a:lvl9pPr>
           </a:lstStyle>
           <a:p>
+            <a:r>
+              <a:rPr lang="en-US"/>
+              <a:t>Click to edit Master title style</a:t>
+            </a:r>
             <a:endParaRPr/>
           </a:p>
         </p:txBody>
@@ -2982,7 +2654,11 @@
             </a:lvl9pPr>
           </a:lstStyle>
           <a:p>
-            <a:endParaRPr/>
+            <a:pPr lvl="0"/>
+            <a:r>
+              <a:rPr lang="en-US"/>
+              <a:t>Click to edit Master text styles</a:t>
+            </a:r>
           </a:p>
         </p:txBody>
       </p:sp>
@@ -3363,6 +3039,11 @@
         </p:txBody>
       </p:sp>
     </p:spTree>
+    <p:extLst>
+      <p:ext uri="{BB962C8B-B14F-4D97-AF65-F5344CB8AC3E}">
+        <p14:creationId xmlns:p14="http://schemas.microsoft.com/office/powerpoint/2010/main" val="2486864358"/>
+      </p:ext>
+    </p:extLst>
   </p:cSld>
   <p:clrMapOvr>
     <a:masterClrMapping/>
@@ -3371,8 +3052,8 @@
 </file>
 
 <file path=ppt/slideLayouts/slideLayout11.xml><?xml version="1.0" encoding="utf-8"?>
-<p:sldLayout xmlns:a="http://schemas.openxmlformats.org/drawingml/2006/main" xmlns:r="http://schemas.openxmlformats.org/officeDocument/2006/relationships" xmlns:p="http://schemas.openxmlformats.org/presentationml/2006/main" matchingName="Vertikaler Titel und Text" type="vertTitleAndTx">
-  <p:cSld name="VERTICAL_TITLE_AND_VERTICAL_TEXT">
+<p:sldLayout xmlns:a="http://schemas.openxmlformats.org/drawingml/2006/main" xmlns:r="http://schemas.openxmlformats.org/officeDocument/2006/relationships" xmlns:p="http://schemas.openxmlformats.org/presentationml/2006/main" matchingName="Vertikaler Titel und Text" type="vertTitleAndTx" preserve="1">
+  <p:cSld name="Vertikaler Titel und Text">
     <p:spTree>
       <p:nvGrpSpPr>
         <p:cNvPr id="1" name="Shape 84"/>
@@ -3522,6 +3203,10 @@
             </a:lvl9pPr>
           </a:lstStyle>
           <a:p>
+            <a:r>
+              <a:rPr lang="en-US"/>
+              <a:t>Click to edit Master title style</a:t>
+            </a:r>
             <a:endParaRPr/>
           </a:p>
         </p:txBody>
@@ -3709,7 +3394,11 @@
             </a:lvl9pPr>
           </a:lstStyle>
           <a:p>
-            <a:endParaRPr/>
+            <a:pPr lvl="0"/>
+            <a:r>
+              <a:rPr lang="en-US"/>
+              <a:t>Click to edit Master text styles</a:t>
+            </a:r>
           </a:p>
         </p:txBody>
       </p:sp>
@@ -4090,6 +3779,11 @@
         </p:txBody>
       </p:sp>
     </p:spTree>
+    <p:extLst>
+      <p:ext uri="{BB962C8B-B14F-4D97-AF65-F5344CB8AC3E}">
+        <p14:creationId xmlns:p14="http://schemas.microsoft.com/office/powerpoint/2010/main" val="715321506"/>
+      </p:ext>
+    </p:extLst>
   </p:cSld>
   <p:clrMapOvr>
     <a:masterClrMapping/>
@@ -4098,8 +3792,8 @@
 </file>
 
 <file path=ppt/slideLayouts/slideLayout2.xml><?xml version="1.0" encoding="utf-8"?>
-<p:sldLayout xmlns:a="http://schemas.openxmlformats.org/drawingml/2006/main" xmlns:r="http://schemas.openxmlformats.org/officeDocument/2006/relationships" xmlns:p="http://schemas.openxmlformats.org/presentationml/2006/main" matchingName="Titel und Inhalt" type="obj">
-  <p:cSld name="OBJECT">
+<p:sldLayout xmlns:a="http://schemas.openxmlformats.org/drawingml/2006/main" xmlns:r="http://schemas.openxmlformats.org/officeDocument/2006/relationships" xmlns:p="http://schemas.openxmlformats.org/presentationml/2006/main" matchingName="Titel und Inhalt" type="obj" preserve="1">
+  <p:cSld name="Titel und Inhalt">
     <p:spTree>
       <p:nvGrpSpPr>
         <p:cNvPr id="1" name="Shape 27"/>
@@ -4254,6 +3948,10 @@
             </a:lvl9pPr>
           </a:lstStyle>
           <a:p>
+            <a:r>
+              <a:rPr lang="en-US"/>
+              <a:t>Click to edit Master title style</a:t>
+            </a:r>
             <a:endParaRPr/>
           </a:p>
         </p:txBody>
@@ -4461,7 +4159,11 @@
             </a:lvl9pPr>
           </a:lstStyle>
           <a:p>
-            <a:endParaRPr/>
+            <a:pPr lvl="0"/>
+            <a:r>
+              <a:rPr lang="en-US"/>
+              <a:t>Click to edit Master text styles</a:t>
+            </a:r>
           </a:p>
         </p:txBody>
       </p:sp>
@@ -4842,6 +4544,11 @@
         </p:txBody>
       </p:sp>
     </p:spTree>
+    <p:extLst>
+      <p:ext uri="{BB962C8B-B14F-4D97-AF65-F5344CB8AC3E}">
+        <p14:creationId xmlns:p14="http://schemas.microsoft.com/office/powerpoint/2010/main" val="3108774163"/>
+      </p:ext>
+    </p:extLst>
   </p:cSld>
   <p:clrMapOvr>
     <a:masterClrMapping/>
@@ -4850,8 +4557,8 @@
 </file>
 
 <file path=ppt/slideLayouts/slideLayout3.xml><?xml version="1.0" encoding="utf-8"?>
-<p:sldLayout xmlns:a="http://schemas.openxmlformats.org/drawingml/2006/main" xmlns:r="http://schemas.openxmlformats.org/officeDocument/2006/relationships" xmlns:p="http://schemas.openxmlformats.org/presentationml/2006/main" matchingName="Zwei Inhalte" type="twoObj">
-  <p:cSld name="TWO_OBJECTS">
+<p:sldLayout xmlns:a="http://schemas.openxmlformats.org/drawingml/2006/main" xmlns:r="http://schemas.openxmlformats.org/officeDocument/2006/relationships" xmlns:p="http://schemas.openxmlformats.org/presentationml/2006/main" matchingName="Zwei Inhalte" type="twoObj" preserve="1">
+  <p:cSld name="Zwei Inhalte">
     <p:spTree>
       <p:nvGrpSpPr>
         <p:cNvPr id="1" name="Shape 33"/>
@@ -5001,6 +4708,10 @@
             </a:lvl9pPr>
           </a:lstStyle>
           <a:p>
+            <a:r>
+              <a:rPr lang="en-US"/>
+              <a:t>Click to edit Master title style</a:t>
+            </a:r>
             <a:endParaRPr/>
           </a:p>
         </p:txBody>
@@ -5188,7 +4899,11 @@
             </a:lvl9pPr>
           </a:lstStyle>
           <a:p>
-            <a:endParaRPr/>
+            <a:pPr lvl="0"/>
+            <a:r>
+              <a:rPr lang="en-US"/>
+              <a:t>Click to edit Master text styles</a:t>
+            </a:r>
           </a:p>
         </p:txBody>
       </p:sp>
@@ -5375,7 +5090,11 @@
             </a:lvl9pPr>
           </a:lstStyle>
           <a:p>
-            <a:endParaRPr/>
+            <a:pPr lvl="0"/>
+            <a:r>
+              <a:rPr lang="en-US"/>
+              <a:t>Click to edit Master text styles</a:t>
+            </a:r>
           </a:p>
         </p:txBody>
       </p:sp>
@@ -5756,6 +5475,11 @@
         </p:txBody>
       </p:sp>
     </p:spTree>
+    <p:extLst>
+      <p:ext uri="{BB962C8B-B14F-4D97-AF65-F5344CB8AC3E}">
+        <p14:creationId xmlns:p14="http://schemas.microsoft.com/office/powerpoint/2010/main" val="1633314865"/>
+      </p:ext>
+    </p:extLst>
   </p:cSld>
   <p:clrMapOvr>
     <a:masterClrMapping/>
@@ -5764,8 +5488,8 @@
 </file>
 
 <file path=ppt/slideLayouts/slideLayout4.xml><?xml version="1.0" encoding="utf-8"?>
-<p:sldLayout xmlns:a="http://schemas.openxmlformats.org/drawingml/2006/main" xmlns:r="http://schemas.openxmlformats.org/officeDocument/2006/relationships" xmlns:p="http://schemas.openxmlformats.org/presentationml/2006/main" matchingName="Vergleich" type="twoTxTwoObj">
-  <p:cSld name="TWO_OBJECTS_WITH_TEXT">
+<p:sldLayout xmlns:a="http://schemas.openxmlformats.org/drawingml/2006/main" xmlns:r="http://schemas.openxmlformats.org/officeDocument/2006/relationships" xmlns:p="http://schemas.openxmlformats.org/presentationml/2006/main" matchingName="Vergleich" type="twoTxTwoObj" preserve="1">
+  <p:cSld name="Vergleich">
     <p:spTree>
       <p:nvGrpSpPr>
         <p:cNvPr id="1" name="Shape 40"/>
@@ -5915,6 +5639,10 @@
             </a:lvl9pPr>
           </a:lstStyle>
           <a:p>
+            <a:r>
+              <a:rPr lang="en-US"/>
+              <a:t>Click to edit Master title style</a:t>
+            </a:r>
             <a:endParaRPr/>
           </a:p>
         </p:txBody>
@@ -6102,7 +5830,11 @@
             </a:lvl9pPr>
           </a:lstStyle>
           <a:p>
-            <a:endParaRPr/>
+            <a:pPr lvl="0"/>
+            <a:r>
+              <a:rPr lang="en-US"/>
+              <a:t>Click to edit Master text styles</a:t>
+            </a:r>
           </a:p>
         </p:txBody>
       </p:sp>
@@ -6289,7 +6021,11 @@
             </a:lvl9pPr>
           </a:lstStyle>
           <a:p>
-            <a:endParaRPr/>
+            <a:pPr lvl="0"/>
+            <a:r>
+              <a:rPr lang="en-US"/>
+              <a:t>Click to edit Master text styles</a:t>
+            </a:r>
           </a:p>
         </p:txBody>
       </p:sp>
@@ -6476,7 +6212,11 @@
             </a:lvl9pPr>
           </a:lstStyle>
           <a:p>
-            <a:endParaRPr/>
+            <a:pPr lvl="0"/>
+            <a:r>
+              <a:rPr lang="en-US"/>
+              <a:t>Click to edit Master text styles</a:t>
+            </a:r>
           </a:p>
         </p:txBody>
       </p:sp>
@@ -6663,7 +6403,11 @@
             </a:lvl9pPr>
           </a:lstStyle>
           <a:p>
-            <a:endParaRPr/>
+            <a:pPr lvl="0"/>
+            <a:r>
+              <a:rPr lang="en-US"/>
+              <a:t>Click to edit Master text styles</a:t>
+            </a:r>
           </a:p>
         </p:txBody>
       </p:sp>
@@ -7044,6 +6788,11 @@
         </p:txBody>
       </p:sp>
     </p:spTree>
+    <p:extLst>
+      <p:ext uri="{BB962C8B-B14F-4D97-AF65-F5344CB8AC3E}">
+        <p14:creationId xmlns:p14="http://schemas.microsoft.com/office/powerpoint/2010/main" val="1116239135"/>
+      </p:ext>
+    </p:extLst>
   </p:cSld>
   <p:clrMapOvr>
     <a:masterClrMapping/>
@@ -7052,8 +6801,8 @@
 </file>
 
 <file path=ppt/slideLayouts/slideLayout5.xml><?xml version="1.0" encoding="utf-8"?>
-<p:sldLayout xmlns:a="http://schemas.openxmlformats.org/drawingml/2006/main" xmlns:r="http://schemas.openxmlformats.org/officeDocument/2006/relationships" xmlns:p="http://schemas.openxmlformats.org/presentationml/2006/main" matchingName="Leer" type="blank">
-  <p:cSld name="BLANK">
+<p:sldLayout xmlns:a="http://schemas.openxmlformats.org/drawingml/2006/main" xmlns:r="http://schemas.openxmlformats.org/officeDocument/2006/relationships" xmlns:p="http://schemas.openxmlformats.org/presentationml/2006/main" matchingName="Leer" type="blank" preserve="1">
+  <p:cSld name="Leer">
     <p:spTree>
       <p:nvGrpSpPr>
         <p:cNvPr id="1" name="Shape 49"/>
@@ -7445,6 +7194,11 @@
         </p:txBody>
       </p:sp>
     </p:spTree>
+    <p:extLst>
+      <p:ext uri="{BB962C8B-B14F-4D97-AF65-F5344CB8AC3E}">
+        <p14:creationId xmlns:p14="http://schemas.microsoft.com/office/powerpoint/2010/main" val="1625973357"/>
+      </p:ext>
+    </p:extLst>
   </p:cSld>
   <p:clrMapOvr>
     <a:masterClrMapping/>
@@ -7453,8 +7207,8 @@
 </file>
 
 <file path=ppt/slideLayouts/slideLayout6.xml><?xml version="1.0" encoding="utf-8"?>
-<p:sldLayout xmlns:a="http://schemas.openxmlformats.org/drawingml/2006/main" xmlns:r="http://schemas.openxmlformats.org/officeDocument/2006/relationships" xmlns:p="http://schemas.openxmlformats.org/presentationml/2006/main" matchingName="Abschnitts-&#10;überschrift" type="secHead">
-  <p:cSld name="SECTION_HEADER">
+<p:sldLayout xmlns:a="http://schemas.openxmlformats.org/drawingml/2006/main" xmlns:r="http://schemas.openxmlformats.org/officeDocument/2006/relationships" xmlns:p="http://schemas.openxmlformats.org/presentationml/2006/main" matchingName="Abschnitts-&#10;überschrift" type="secHead" preserve="1">
+  <p:cSld name="Abschnitts-&#10;überschrift">
     <p:spTree>
       <p:nvGrpSpPr>
         <p:cNvPr id="1" name="Shape 53"/>
@@ -7605,6 +7359,10 @@
             </a:lvl9pPr>
           </a:lstStyle>
           <a:p>
+            <a:r>
+              <a:rPr lang="en-US"/>
+              <a:t>Click to edit Master title style</a:t>
+            </a:r>
             <a:endParaRPr/>
           </a:p>
         </p:txBody>
@@ -7828,7 +7586,11 @@
             </a:lvl9pPr>
           </a:lstStyle>
           <a:p>
-            <a:endParaRPr/>
+            <a:pPr lvl="0"/>
+            <a:r>
+              <a:rPr lang="en-US"/>
+              <a:t>Click to edit Master text styles</a:t>
+            </a:r>
           </a:p>
         </p:txBody>
       </p:sp>
@@ -8209,6 +7971,11 @@
         </p:txBody>
       </p:sp>
     </p:spTree>
+    <p:extLst>
+      <p:ext uri="{BB962C8B-B14F-4D97-AF65-F5344CB8AC3E}">
+        <p14:creationId xmlns:p14="http://schemas.microsoft.com/office/powerpoint/2010/main" val="223383340"/>
+      </p:ext>
+    </p:extLst>
   </p:cSld>
   <p:clrMapOvr>
     <a:masterClrMapping/>
@@ -8217,8 +7984,8 @@
 </file>
 
 <file path=ppt/slideLayouts/slideLayout7.xml><?xml version="1.0" encoding="utf-8"?>
-<p:sldLayout xmlns:a="http://schemas.openxmlformats.org/drawingml/2006/main" xmlns:r="http://schemas.openxmlformats.org/officeDocument/2006/relationships" xmlns:p="http://schemas.openxmlformats.org/presentationml/2006/main" matchingName="Nur Titel" type="titleOnly">
-  <p:cSld name="TITLE_ONLY">
+<p:sldLayout xmlns:a="http://schemas.openxmlformats.org/drawingml/2006/main" xmlns:r="http://schemas.openxmlformats.org/officeDocument/2006/relationships" xmlns:p="http://schemas.openxmlformats.org/presentationml/2006/main" matchingName="Nur Titel" type="titleOnly" preserve="1">
+  <p:cSld name="Nur Titel">
     <p:spTree>
       <p:nvGrpSpPr>
         <p:cNvPr id="1" name="Shape 59"/>
@@ -8368,6 +8135,10 @@
             </a:lvl9pPr>
           </a:lstStyle>
           <a:p>
+            <a:r>
+              <a:rPr lang="en-US"/>
+              <a:t>Click to edit Master title style</a:t>
+            </a:r>
             <a:endParaRPr/>
           </a:p>
         </p:txBody>
@@ -8749,6 +8520,11 @@
         </p:txBody>
       </p:sp>
     </p:spTree>
+    <p:extLst>
+      <p:ext uri="{BB962C8B-B14F-4D97-AF65-F5344CB8AC3E}">
+        <p14:creationId xmlns:p14="http://schemas.microsoft.com/office/powerpoint/2010/main" val="2488033322"/>
+      </p:ext>
+    </p:extLst>
   </p:cSld>
   <p:clrMapOvr>
     <a:masterClrMapping/>
@@ -8757,8 +8533,8 @@
 </file>
 
 <file path=ppt/slideLayouts/slideLayout8.xml><?xml version="1.0" encoding="utf-8"?>
-<p:sldLayout xmlns:a="http://schemas.openxmlformats.org/drawingml/2006/main" xmlns:r="http://schemas.openxmlformats.org/officeDocument/2006/relationships" xmlns:p="http://schemas.openxmlformats.org/presentationml/2006/main" matchingName="Inhalt mit Überschrift" type="objTx">
-  <p:cSld name="OBJECT_WITH_CAPTION_TEXT">
+<p:sldLayout xmlns:a="http://schemas.openxmlformats.org/drawingml/2006/main" xmlns:r="http://schemas.openxmlformats.org/officeDocument/2006/relationships" xmlns:p="http://schemas.openxmlformats.org/presentationml/2006/main" matchingName="Inhalt mit Überschrift" type="objTx" preserve="1">
+  <p:cSld name="Inhalt mit Überschrift">
     <p:spTree>
       <p:nvGrpSpPr>
         <p:cNvPr id="1" name="Shape 64"/>
@@ -8909,6 +8685,10 @@
             </a:lvl9pPr>
           </a:lstStyle>
           <a:p>
+            <a:r>
+              <a:rPr lang="en-US"/>
+              <a:t>Click to edit Master title style</a:t>
+            </a:r>
             <a:endParaRPr/>
           </a:p>
         </p:txBody>
@@ -9096,7 +8876,11 @@
             </a:lvl9pPr>
           </a:lstStyle>
           <a:p>
-            <a:endParaRPr/>
+            <a:pPr lvl="0"/>
+            <a:r>
+              <a:rPr lang="en-US"/>
+              <a:t>Click to edit Master text styles</a:t>
+            </a:r>
           </a:p>
         </p:txBody>
       </p:sp>
@@ -9283,7 +9067,11 @@
             </a:lvl9pPr>
           </a:lstStyle>
           <a:p>
-            <a:endParaRPr/>
+            <a:pPr lvl="0"/>
+            <a:r>
+              <a:rPr lang="en-US"/>
+              <a:t>Click to edit Master text styles</a:t>
+            </a:r>
           </a:p>
         </p:txBody>
       </p:sp>
@@ -9664,6 +9452,11 @@
         </p:txBody>
       </p:sp>
     </p:spTree>
+    <p:extLst>
+      <p:ext uri="{BB962C8B-B14F-4D97-AF65-F5344CB8AC3E}">
+        <p14:creationId xmlns:p14="http://schemas.microsoft.com/office/powerpoint/2010/main" val="2702579319"/>
+      </p:ext>
+    </p:extLst>
   </p:cSld>
   <p:clrMapOvr>
     <a:masterClrMapping/>
@@ -9672,8 +9465,8 @@
 </file>
 
 <file path=ppt/slideLayouts/slideLayout9.xml><?xml version="1.0" encoding="utf-8"?>
-<p:sldLayout xmlns:a="http://schemas.openxmlformats.org/drawingml/2006/main" xmlns:r="http://schemas.openxmlformats.org/officeDocument/2006/relationships" xmlns:p="http://schemas.openxmlformats.org/presentationml/2006/main" matchingName="Bild mit Überschrift" type="picTx">
-  <p:cSld name="PICTURE_WITH_CAPTION_TEXT">
+<p:sldLayout xmlns:a="http://schemas.openxmlformats.org/drawingml/2006/main" xmlns:r="http://schemas.openxmlformats.org/officeDocument/2006/relationships" xmlns:p="http://schemas.openxmlformats.org/presentationml/2006/main" matchingName="Bild mit Überschrift" type="picTx" preserve="1">
+  <p:cSld name="Bild mit Überschrift">
     <p:spTree>
       <p:nvGrpSpPr>
         <p:cNvPr id="1" name="Shape 71"/>
@@ -9824,6 +9617,10 @@
             </a:lvl9pPr>
           </a:lstStyle>
           <a:p>
+            <a:r>
+              <a:rPr lang="en-US"/>
+              <a:t>Click to edit Master title style</a:t>
+            </a:r>
             <a:endParaRPr/>
           </a:p>
         </p:txBody>
@@ -10092,6 +9889,10 @@
             </a:lvl9pPr>
           </a:lstStyle>
           <a:p>
+            <a:r>
+              <a:rPr lang="en-US"/>
+              <a:t>Click icon to add picture</a:t>
+            </a:r>
             <a:endParaRPr/>
           </a:p>
         </p:txBody>
@@ -10279,7 +10080,11 @@
             </a:lvl9pPr>
           </a:lstStyle>
           <a:p>
-            <a:endParaRPr/>
+            <a:pPr lvl="0"/>
+            <a:r>
+              <a:rPr lang="en-US"/>
+              <a:t>Click to edit Master text styles</a:t>
+            </a:r>
           </a:p>
         </p:txBody>
       </p:sp>
@@ -10660,6 +10465,11 @@
         </p:txBody>
       </p:sp>
     </p:spTree>
+    <p:extLst>
+      <p:ext uri="{BB962C8B-B14F-4D97-AF65-F5344CB8AC3E}">
+        <p14:creationId xmlns:p14="http://schemas.microsoft.com/office/powerpoint/2010/main" val="918753614"/>
+      </p:ext>
+    </p:extLst>
   </p:cSld>
   <p:clrMapOvr>
     <a:masterClrMapping/>
@@ -10668,7 +10478,7 @@
 </file>
 
 <file path=ppt/slideMasters/slideMaster1.xml><?xml version="1.0" encoding="utf-8"?>
-<p:sldMaster xmlns:a="http://schemas.openxmlformats.org/drawingml/2006/main" xmlns:r="http://schemas.openxmlformats.org/officeDocument/2006/relationships" xmlns:p="http://schemas.openxmlformats.org/presentationml/2006/main">
+<p:sldMaster xmlns:a="http://schemas.openxmlformats.org/drawingml/2006/main" xmlns:r="http://schemas.openxmlformats.org/officeDocument/2006/relationships" xmlns:p="http://schemas.openxmlformats.org/presentationml/2006/main" preserve="1">
   <p:cSld>
     <p:bg>
       <p:bgPr>
@@ -10696,7 +10506,7 @@
         <p:nvSpPr>
           <p:cNvPr id="6" name="Google Shape;6;p6"/>
           <p:cNvSpPr/>
-          <p:nvPr userDrawn="1"/>
+          <p:nvPr/>
         </p:nvSpPr>
         <p:spPr>
           <a:xfrm>
@@ -11752,70 +11562,48 @@
           </a:p>
         </p:txBody>
       </p:sp>
-      <p:sp>
-        <p:nvSpPr>
-          <p:cNvPr id="12" name="Google Shape;6;p6">
+      <p:cxnSp>
+        <p:nvCxnSpPr>
+          <p:cNvPr id="17" name="Straight Connector 16">
             <a:extLst>
               <a:ext uri="{FF2B5EF4-FFF2-40B4-BE49-F238E27FC236}">
-                <a16:creationId xmlns:a16="http://schemas.microsoft.com/office/drawing/2014/main" id="{708B1D12-3B9E-4146-AD8A-03131E2AB00E}"/>
+                <a16:creationId xmlns:a16="http://schemas.microsoft.com/office/drawing/2014/main" id="{8775FA87-6743-401D-B5FF-D8F43D673A1B}"/>
               </a:ext>
             </a:extLst>
           </p:cNvPr>
-          <p:cNvSpPr/>
+          <p:cNvCxnSpPr/>
           <p:nvPr userDrawn="1"/>
-        </p:nvSpPr>
+        </p:nvCxnSpPr>
         <p:spPr>
           <a:xfrm>
-            <a:off x="10050830" y="0"/>
-            <a:ext cx="2141170" cy="6858000"/>
+            <a:off x="10057975" y="2187724"/>
+            <a:ext cx="2124000" cy="0"/>
           </a:xfrm>
-          <a:prstGeom prst="rect">
+          <a:prstGeom prst="line">
             <a:avLst/>
           </a:prstGeom>
-          <a:solidFill>
-            <a:srgbClr val="262626"/>
-          </a:solidFill>
-          <a:ln w="9525" cap="flat" cmpd="sng">
-            <a:noFill/>
-            <a:prstDash val="solid"/>
-            <a:miter lim="800000"/>
-            <a:headEnd type="none" w="sm" len="sm"/>
-            <a:tailEnd type="none" w="sm" len="sm"/>
-          </a:ln>
         </p:spPr>
-        <p:txBody>
-          <a:bodyPr spcFirstLastPara="1" wrap="square" lIns="91425" tIns="45700" rIns="91425" bIns="45700" anchor="ctr" anchorCtr="0">
-            <a:noAutofit/>
-          </a:bodyPr>
-          <a:lstStyle/>
-          <a:p>
-            <a:pPr marL="0" marR="0" lvl="0" indent="0" algn="ctr" rtl="0">
-              <a:spcBef>
-                <a:spcPts val="0"/>
-              </a:spcBef>
-              <a:spcAft>
-                <a:spcPts val="0"/>
-              </a:spcAft>
-              <a:buNone/>
-            </a:pPr>
-            <a:endParaRPr sz="1800" b="0" i="0" u="none" strike="noStrike" cap="none">
-              <a:solidFill>
-                <a:schemeClr val="dk1"/>
-              </a:solidFill>
-              <a:latin typeface="Calibri"/>
-              <a:ea typeface="Calibri"/>
-              <a:cs typeface="Calibri"/>
-              <a:sym typeface="Calibri"/>
-            </a:endParaRPr>
-          </a:p>
-        </p:txBody>
-      </p:sp>
+        <p:style>
+          <a:lnRef idx="1">
+            <a:schemeClr val="accent3"/>
+          </a:lnRef>
+          <a:fillRef idx="0">
+            <a:schemeClr val="accent3"/>
+          </a:fillRef>
+          <a:effectRef idx="0">
+            <a:schemeClr val="accent3"/>
+          </a:effectRef>
+          <a:fontRef idx="minor">
+            <a:schemeClr val="tx1"/>
+          </a:fontRef>
+        </p:style>
+      </p:cxnSp>
       <p:pic>
         <p:nvPicPr>
-          <p:cNvPr id="13" name="Picture 12">
+          <p:cNvPr id="3" name="Picture 2" descr="A picture containing object, clock, drawing&#10;&#10;Description automatically generated">
             <a:extLst>
               <a:ext uri="{FF2B5EF4-FFF2-40B4-BE49-F238E27FC236}">
-                <a16:creationId xmlns:a16="http://schemas.microsoft.com/office/drawing/2014/main" id="{F69CC3C0-D899-430F-B719-61FE2D424163}"/>
+                <a16:creationId xmlns:a16="http://schemas.microsoft.com/office/drawing/2014/main" id="{3FEDD065-FBCC-4270-82D2-2396A5FD5B10}"/>
               </a:ext>
             </a:extLst>
           </p:cNvPr>
@@ -11825,73 +11613,10 @@
           <p:nvPr userDrawn="1"/>
         </p:nvPicPr>
         <p:blipFill>
-          <a:blip r:embed="rId13"/>
-          <a:stretch>
-            <a:fillRect/>
-          </a:stretch>
-        </p:blipFill>
-        <p:spPr>
-          <a:xfrm>
-            <a:off x="10233499" y="5041454"/>
-            <a:ext cx="1775832" cy="1482434"/>
-          </a:xfrm>
-          <a:prstGeom prst="rect">
-            <a:avLst/>
-          </a:prstGeom>
-        </p:spPr>
-      </p:pic>
-      <p:pic>
-        <p:nvPicPr>
-          <p:cNvPr id="14" name="Picture 13">
-            <a:extLst>
-              <a:ext uri="{FF2B5EF4-FFF2-40B4-BE49-F238E27FC236}">
-                <a16:creationId xmlns:a16="http://schemas.microsoft.com/office/drawing/2014/main" id="{4C5DFCCE-24E6-476F-A480-13433141C050}"/>
-              </a:ext>
-            </a:extLst>
-          </p:cNvPr>
-          <p:cNvPicPr>
-            <a:picLocks noChangeAspect="1"/>
-          </p:cNvPicPr>
-          <p:nvPr userDrawn="1"/>
-        </p:nvPicPr>
-        <p:blipFill>
-          <a:blip r:embed="rId14"/>
-          <a:stretch>
-            <a:fillRect/>
-          </a:stretch>
-        </p:blipFill>
-        <p:spPr>
-          <a:xfrm>
-            <a:off x="10158175" y="283009"/>
-            <a:ext cx="1926479" cy="1692000"/>
-          </a:xfrm>
-          <a:prstGeom prst="rect">
-            <a:avLst/>
-          </a:prstGeom>
-        </p:spPr>
-      </p:pic>
-      <p:pic>
-        <p:nvPicPr>
-          <p:cNvPr id="15" name="Graphic 14">
-            <a:extLst>
-              <a:ext uri="{FF2B5EF4-FFF2-40B4-BE49-F238E27FC236}">
-                <a16:creationId xmlns:a16="http://schemas.microsoft.com/office/drawing/2014/main" id="{7D9B9FDD-F0AD-461D-B1F6-84FA1236DC76}"/>
-              </a:ext>
-            </a:extLst>
-          </p:cNvPr>
-          <p:cNvPicPr>
-            <a:picLocks noChangeAspect="1"/>
-          </p:cNvPicPr>
-          <p:nvPr userDrawn="1"/>
-        </p:nvPicPr>
-        <p:blipFill>
-          <a:blip r:embed="rId15">
+          <a:blip r:embed="rId13">
             <a:extLst>
               <a:ext uri="{28A0092B-C50C-407E-A947-70E740481C1C}">
                 <a14:useLocalDpi xmlns:a14="http://schemas.microsoft.com/office/drawing/2010/main" val="0"/>
-              </a:ext>
-              <a:ext uri="{96DAC541-7B7A-43D3-8B79-37D633B846F1}">
-                <asvg:svgBlip xmlns:asvg="http://schemas.microsoft.com/office/drawing/2016/SVG/main" r:embed="rId16"/>
               </a:ext>
             </a:extLst>
           </a:blip>
@@ -11901,29 +11626,182 @@
         </p:blipFill>
         <p:spPr>
           <a:xfrm>
-            <a:off x="10119967" y="4031625"/>
-            <a:ext cx="1952625" cy="600075"/>
+            <a:off x="10235205" y="861715"/>
+            <a:ext cx="1762898" cy="464294"/>
           </a:xfrm>
           <a:prstGeom prst="rect">
             <a:avLst/>
           </a:prstGeom>
         </p:spPr>
       </p:pic>
+      <p:sp>
+        <p:nvSpPr>
+          <p:cNvPr id="4" name="TextBox 3">
+            <a:extLst>
+              <a:ext uri="{FF2B5EF4-FFF2-40B4-BE49-F238E27FC236}">
+                <a16:creationId xmlns:a16="http://schemas.microsoft.com/office/drawing/2014/main" id="{571CE32D-1145-4AB2-83AA-C5825EDE1781}"/>
+              </a:ext>
+            </a:extLst>
+          </p:cNvPr>
+          <p:cNvSpPr txBox="1"/>
+          <p:nvPr userDrawn="1"/>
+        </p:nvSpPr>
+        <p:spPr>
+          <a:xfrm>
+            <a:off x="10124303" y="4934465"/>
+            <a:ext cx="2028093" cy="1569660"/>
+          </a:xfrm>
+          <a:prstGeom prst="rect">
+            <a:avLst/>
+          </a:prstGeom>
+          <a:noFill/>
+        </p:spPr>
+        <p:txBody>
+          <a:bodyPr wrap="square" rtlCol="0">
+            <a:spAutoFit/>
+          </a:bodyPr>
+          <a:lstStyle/>
+          <a:p>
+            <a:r>
+              <a:rPr lang="de-DE" sz="1600" dirty="0">
+                <a:solidFill>
+                  <a:schemeClr val="bg1">
+                    <a:lumMod val="85000"/>
+                  </a:schemeClr>
+                </a:solidFill>
+                <a:latin typeface="BusinessSuiteInAppSymbols" panose="02000503000000000000" pitchFamily="2" charset="0"/>
+              </a:rPr>
+              <a:t> </a:t>
+            </a:r>
+            <a:r>
+              <a:rPr lang="de-DE" sz="1600" dirty="0">
+                <a:solidFill>
+                  <a:schemeClr val="bg1">
+                    <a:lumMod val="85000"/>
+                  </a:schemeClr>
+                </a:solidFill>
+              </a:rPr>
+              <a:t>Cimt AG</a:t>
+            </a:r>
+          </a:p>
+          <a:p>
+            <a:r>
+              <a:rPr lang="de-DE" sz="1600" dirty="0">
+                <a:solidFill>
+                  <a:schemeClr val="bg1">
+                    <a:lumMod val="85000"/>
+                  </a:schemeClr>
+                </a:solidFill>
+              </a:rPr>
+              <a:t>Oskar-Jäger-Str.170</a:t>
+            </a:r>
+          </a:p>
+          <a:p>
+            <a:r>
+              <a:rPr lang="de-DE" sz="1600" dirty="0">
+                <a:solidFill>
+                  <a:schemeClr val="bg1">
+                    <a:lumMod val="85000"/>
+                  </a:schemeClr>
+                </a:solidFill>
+              </a:rPr>
+              <a:t>50825 Köln</a:t>
+            </a:r>
+          </a:p>
+          <a:p>
+            <a:endParaRPr lang="en-US" sz="1600" dirty="0">
+              <a:solidFill>
+                <a:schemeClr val="bg1">
+                  <a:lumMod val="85000"/>
+                </a:schemeClr>
+              </a:solidFill>
+            </a:endParaRPr>
+          </a:p>
+          <a:p>
+            <a:r>
+              <a:rPr lang="de-DE" sz="1600" dirty="0">
+                <a:solidFill>
+                  <a:schemeClr val="bg1">
+                    <a:lumMod val="85000"/>
+                  </a:schemeClr>
+                </a:solidFill>
+                <a:latin typeface="BusinessSuiteInAppSymbols" panose="02000503000000000000" pitchFamily="2" charset="0"/>
+              </a:rPr>
+              <a:t> </a:t>
+            </a:r>
+            <a:r>
+              <a:rPr lang="en-US" sz="1600" dirty="0">
+                <a:solidFill>
+                  <a:schemeClr val="bg1">
+                    <a:lumMod val="85000"/>
+                  </a:schemeClr>
+                </a:solidFill>
+              </a:rPr>
+              <a:t>0221 3679860</a:t>
+            </a:r>
+          </a:p>
+          <a:p>
+            <a:pPr marL="0" marR="0" lvl="0" indent="0" algn="l" defTabSz="914400" rtl="0" eaLnBrk="1" fontAlgn="auto" latinLnBrk="0" hangingPunct="1">
+              <a:lnSpc>
+                <a:spcPct val="100000"/>
+              </a:lnSpc>
+              <a:spcBef>
+                <a:spcPts val="0"/>
+              </a:spcBef>
+              <a:spcAft>
+                <a:spcPts val="0"/>
+              </a:spcAft>
+              <a:buClrTx/>
+              <a:buSzTx/>
+              <a:buFontTx/>
+              <a:buNone/>
+              <a:tabLst/>
+              <a:defRPr/>
+            </a:pPr>
+            <a:r>
+              <a:rPr lang="de-DE" sz="1600" dirty="0">
+                <a:solidFill>
+                  <a:schemeClr val="bg1">
+                    <a:lumMod val="85000"/>
+                  </a:schemeClr>
+                </a:solidFill>
+                <a:latin typeface="BusinessSuiteInAppSymbols" panose="02000503000000000000" pitchFamily="2" charset="0"/>
+              </a:rPr>
+              <a:t> </a:t>
+            </a:r>
+            <a:r>
+              <a:rPr lang="en-US" sz="1600" dirty="0">
+                <a:solidFill>
+                  <a:schemeClr val="bg1">
+                    <a:lumMod val="85000"/>
+                  </a:schemeClr>
+                </a:solidFill>
+              </a:rPr>
+              <a:t>info@cimply.me</a:t>
+            </a:r>
+          </a:p>
+        </p:txBody>
+      </p:sp>
     </p:spTree>
+    <p:extLst>
+      <p:ext uri="{BB962C8B-B14F-4D97-AF65-F5344CB8AC3E}">
+        <p14:creationId xmlns:p14="http://schemas.microsoft.com/office/powerpoint/2010/main" val="996990258"/>
+      </p:ext>
+    </p:extLst>
   </p:cSld>
   <p:clrMap bg1="lt1" tx1="dk1" bg2="dk2" tx2="lt2" accent1="accent1" accent2="accent2" accent3="accent3" accent4="accent4" accent5="accent5" accent6="accent6" hlink="hlink" folHlink="folHlink"/>
   <p:sldLayoutIdLst>
-    <p:sldLayoutId id="2147483649" r:id="rId1"/>
-    <p:sldLayoutId id="2147483650" r:id="rId2"/>
-    <p:sldLayoutId id="2147483651" r:id="rId3"/>
-    <p:sldLayoutId id="2147483652" r:id="rId4"/>
-    <p:sldLayoutId id="2147483653" r:id="rId5"/>
-    <p:sldLayoutId id="2147483654" r:id="rId6"/>
-    <p:sldLayoutId id="2147483655" r:id="rId7"/>
-    <p:sldLayoutId id="2147483656" r:id="rId8"/>
-    <p:sldLayoutId id="2147483657" r:id="rId9"/>
-    <p:sldLayoutId id="2147483658" r:id="rId10"/>
-    <p:sldLayoutId id="2147483659" r:id="rId11"/>
+    <p:sldLayoutId id="2147483661" r:id="rId1"/>
+    <p:sldLayoutId id="2147483662" r:id="rId2"/>
+    <p:sldLayoutId id="2147483663" r:id="rId3"/>
+    <p:sldLayoutId id="2147483664" r:id="rId4"/>
+    <p:sldLayoutId id="2147483665" r:id="rId5"/>
+    <p:sldLayoutId id="2147483666" r:id="rId6"/>
+    <p:sldLayoutId id="2147483667" r:id="rId7"/>
+    <p:sldLayoutId id="2147483668" r:id="rId8"/>
+    <p:sldLayoutId id="2147483669" r:id="rId9"/>
+    <p:sldLayoutId id="2147483670" r:id="rId10"/>
+    <p:sldLayoutId id="2147483671" r:id="rId11"/>
   </p:sldLayoutIdLst>
   <p:hf sldNum="0" hdr="0" ftr="0" dt="0"/>
   <p:txStyles>
@@ -11939,7 +11817,7 @@
           <a:spcPts val="0"/>
         </a:spcAft>
       </a:defPPr>
-      <a:lvl1pPr marR="0" lvl="0" algn="l" rtl="0">
+      <a:lvl1pPr marR="0" lvl="0" algn="l" rtl="0" eaLnBrk="1" hangingPunct="1">
         <a:lnSpc>
           <a:spcPct val="100000"/>
         </a:lnSpc>
@@ -11963,7 +11841,7 @@
           <a:sym typeface="Arial"/>
         </a:defRPr>
       </a:lvl1pPr>
-      <a:lvl2pPr marR="0" lvl="1" algn="l" rtl="0">
+      <a:lvl2pPr marR="0" lvl="1" algn="l" rtl="0" eaLnBrk="1" hangingPunct="1">
         <a:lnSpc>
           <a:spcPct val="100000"/>
         </a:lnSpc>
@@ -11987,7 +11865,7 @@
           <a:sym typeface="Arial"/>
         </a:defRPr>
       </a:lvl2pPr>
-      <a:lvl3pPr marR="0" lvl="2" algn="l" rtl="0">
+      <a:lvl3pPr marR="0" lvl="2" algn="l" rtl="0" eaLnBrk="1" hangingPunct="1">
         <a:lnSpc>
           <a:spcPct val="100000"/>
         </a:lnSpc>
@@ -12011,7 +11889,7 @@
           <a:sym typeface="Arial"/>
         </a:defRPr>
       </a:lvl3pPr>
-      <a:lvl4pPr marR="0" lvl="3" algn="l" rtl="0">
+      <a:lvl4pPr marR="0" lvl="3" algn="l" rtl="0" eaLnBrk="1" hangingPunct="1">
         <a:lnSpc>
           <a:spcPct val="100000"/>
         </a:lnSpc>
@@ -12035,7 +11913,7 @@
           <a:sym typeface="Arial"/>
         </a:defRPr>
       </a:lvl4pPr>
-      <a:lvl5pPr marR="0" lvl="4" algn="l" rtl="0">
+      <a:lvl5pPr marR="0" lvl="4" algn="l" rtl="0" eaLnBrk="1" hangingPunct="1">
         <a:lnSpc>
           <a:spcPct val="100000"/>
         </a:lnSpc>
@@ -12059,7 +11937,7 @@
           <a:sym typeface="Arial"/>
         </a:defRPr>
       </a:lvl5pPr>
-      <a:lvl6pPr marR="0" lvl="5" algn="l" rtl="0">
+      <a:lvl6pPr marR="0" lvl="5" algn="l" rtl="0" eaLnBrk="1" hangingPunct="1">
         <a:lnSpc>
           <a:spcPct val="100000"/>
         </a:lnSpc>
@@ -12083,7 +11961,7 @@
           <a:sym typeface="Arial"/>
         </a:defRPr>
       </a:lvl6pPr>
-      <a:lvl7pPr marR="0" lvl="6" algn="l" rtl="0">
+      <a:lvl7pPr marR="0" lvl="6" algn="l" rtl="0" eaLnBrk="1" hangingPunct="1">
         <a:lnSpc>
           <a:spcPct val="100000"/>
         </a:lnSpc>
@@ -12107,7 +11985,7 @@
           <a:sym typeface="Arial"/>
         </a:defRPr>
       </a:lvl7pPr>
-      <a:lvl8pPr marR="0" lvl="7" algn="l" rtl="0">
+      <a:lvl8pPr marR="0" lvl="7" algn="l" rtl="0" eaLnBrk="1" hangingPunct="1">
         <a:lnSpc>
           <a:spcPct val="100000"/>
         </a:lnSpc>
@@ -12131,7 +12009,7 @@
           <a:sym typeface="Arial"/>
         </a:defRPr>
       </a:lvl8pPr>
-      <a:lvl9pPr marR="0" lvl="8" algn="l" rtl="0">
+      <a:lvl9pPr marR="0" lvl="8" algn="l" rtl="0" eaLnBrk="1" hangingPunct="1">
         <a:lnSpc>
           <a:spcPct val="100000"/>
         </a:lnSpc>
@@ -12168,7 +12046,7 @@
           <a:spcPts val="0"/>
         </a:spcAft>
       </a:defPPr>
-      <a:lvl1pPr marR="0" lvl="0" algn="l" rtl="0">
+      <a:lvl1pPr marR="0" lvl="0" algn="l" rtl="0" eaLnBrk="1" hangingPunct="1">
         <a:lnSpc>
           <a:spcPct val="100000"/>
         </a:lnSpc>
@@ -12192,7 +12070,7 @@
           <a:sym typeface="Arial"/>
         </a:defRPr>
       </a:lvl1pPr>
-      <a:lvl2pPr marR="0" lvl="1" algn="l" rtl="0">
+      <a:lvl2pPr marR="0" lvl="1" algn="l" rtl="0" eaLnBrk="1" hangingPunct="1">
         <a:lnSpc>
           <a:spcPct val="100000"/>
         </a:lnSpc>
@@ -12216,7 +12094,7 @@
           <a:sym typeface="Arial"/>
         </a:defRPr>
       </a:lvl2pPr>
-      <a:lvl3pPr marR="0" lvl="2" algn="l" rtl="0">
+      <a:lvl3pPr marR="0" lvl="2" algn="l" rtl="0" eaLnBrk="1" hangingPunct="1">
         <a:lnSpc>
           <a:spcPct val="100000"/>
         </a:lnSpc>
@@ -12240,7 +12118,7 @@
           <a:sym typeface="Arial"/>
         </a:defRPr>
       </a:lvl3pPr>
-      <a:lvl4pPr marR="0" lvl="3" algn="l" rtl="0">
+      <a:lvl4pPr marR="0" lvl="3" algn="l" rtl="0" eaLnBrk="1" hangingPunct="1">
         <a:lnSpc>
           <a:spcPct val="100000"/>
         </a:lnSpc>
@@ -12264,7 +12142,7 @@
           <a:sym typeface="Arial"/>
         </a:defRPr>
       </a:lvl4pPr>
-      <a:lvl5pPr marR="0" lvl="4" algn="l" rtl="0">
+      <a:lvl5pPr marR="0" lvl="4" algn="l" rtl="0" eaLnBrk="1" hangingPunct="1">
         <a:lnSpc>
           <a:spcPct val="100000"/>
         </a:lnSpc>
@@ -12288,7 +12166,7 @@
           <a:sym typeface="Arial"/>
         </a:defRPr>
       </a:lvl5pPr>
-      <a:lvl6pPr marR="0" lvl="5" algn="l" rtl="0">
+      <a:lvl6pPr marR="0" lvl="5" algn="l" rtl="0" eaLnBrk="1" hangingPunct="1">
         <a:lnSpc>
           <a:spcPct val="100000"/>
         </a:lnSpc>
@@ -12312,7 +12190,7 @@
           <a:sym typeface="Arial"/>
         </a:defRPr>
       </a:lvl6pPr>
-      <a:lvl7pPr marR="0" lvl="6" algn="l" rtl="0">
+      <a:lvl7pPr marR="0" lvl="6" algn="l" rtl="0" eaLnBrk="1" hangingPunct="1">
         <a:lnSpc>
           <a:spcPct val="100000"/>
         </a:lnSpc>
@@ -12336,7 +12214,7 @@
           <a:sym typeface="Arial"/>
         </a:defRPr>
       </a:lvl7pPr>
-      <a:lvl8pPr marR="0" lvl="7" algn="l" rtl="0">
+      <a:lvl8pPr marR="0" lvl="7" algn="l" rtl="0" eaLnBrk="1" hangingPunct="1">
         <a:lnSpc>
           <a:spcPct val="100000"/>
         </a:lnSpc>
@@ -12360,7 +12238,7 @@
           <a:sym typeface="Arial"/>
         </a:defRPr>
       </a:lvl8pPr>
-      <a:lvl9pPr marR="0" lvl="8" algn="l" rtl="0">
+      <a:lvl9pPr marR="0" lvl="8" algn="l" rtl="0" eaLnBrk="1" hangingPunct="1">
         <a:lnSpc>
           <a:spcPct val="100000"/>
         </a:lnSpc>
@@ -12397,7 +12275,7 @@
           <a:spcPts val="0"/>
         </a:spcAft>
       </a:defPPr>
-      <a:lvl1pPr marR="0" lvl="0" algn="l" rtl="0">
+      <a:lvl1pPr marR="0" lvl="0" algn="l" rtl="0" eaLnBrk="1" hangingPunct="1">
         <a:lnSpc>
           <a:spcPct val="100000"/>
         </a:lnSpc>
@@ -12421,7 +12299,7 @@
           <a:sym typeface="Arial"/>
         </a:defRPr>
       </a:lvl1pPr>
-      <a:lvl2pPr marR="0" lvl="1" algn="l" rtl="0">
+      <a:lvl2pPr marR="0" lvl="1" algn="l" rtl="0" eaLnBrk="1" hangingPunct="1">
         <a:lnSpc>
           <a:spcPct val="100000"/>
         </a:lnSpc>
@@ -12445,7 +12323,7 @@
           <a:sym typeface="Arial"/>
         </a:defRPr>
       </a:lvl2pPr>
-      <a:lvl3pPr marR="0" lvl="2" algn="l" rtl="0">
+      <a:lvl3pPr marR="0" lvl="2" algn="l" rtl="0" eaLnBrk="1" hangingPunct="1">
         <a:lnSpc>
           <a:spcPct val="100000"/>
         </a:lnSpc>
@@ -12469,7 +12347,7 @@
           <a:sym typeface="Arial"/>
         </a:defRPr>
       </a:lvl3pPr>
-      <a:lvl4pPr marR="0" lvl="3" algn="l" rtl="0">
+      <a:lvl4pPr marR="0" lvl="3" algn="l" rtl="0" eaLnBrk="1" hangingPunct="1">
         <a:lnSpc>
           <a:spcPct val="100000"/>
         </a:lnSpc>
@@ -12493,7 +12371,7 @@
           <a:sym typeface="Arial"/>
         </a:defRPr>
       </a:lvl4pPr>
-      <a:lvl5pPr marR="0" lvl="4" algn="l" rtl="0">
+      <a:lvl5pPr marR="0" lvl="4" algn="l" rtl="0" eaLnBrk="1" hangingPunct="1">
         <a:lnSpc>
           <a:spcPct val="100000"/>
         </a:lnSpc>
@@ -12517,7 +12395,7 @@
           <a:sym typeface="Arial"/>
         </a:defRPr>
       </a:lvl5pPr>
-      <a:lvl6pPr marR="0" lvl="5" algn="l" rtl="0">
+      <a:lvl6pPr marR="0" lvl="5" algn="l" rtl="0" eaLnBrk="1" hangingPunct="1">
         <a:lnSpc>
           <a:spcPct val="100000"/>
         </a:lnSpc>
@@ -12541,7 +12419,7 @@
           <a:sym typeface="Arial"/>
         </a:defRPr>
       </a:lvl6pPr>
-      <a:lvl7pPr marR="0" lvl="6" algn="l" rtl="0">
+      <a:lvl7pPr marR="0" lvl="6" algn="l" rtl="0" eaLnBrk="1" hangingPunct="1">
         <a:lnSpc>
           <a:spcPct val="100000"/>
         </a:lnSpc>
@@ -12565,7 +12443,7 @@
           <a:sym typeface="Arial"/>
         </a:defRPr>
       </a:lvl7pPr>
-      <a:lvl8pPr marR="0" lvl="7" algn="l" rtl="0">
+      <a:lvl8pPr marR="0" lvl="7" algn="l" rtl="0" eaLnBrk="1" hangingPunct="1">
         <a:lnSpc>
           <a:spcPct val="100000"/>
         </a:lnSpc>
@@ -12589,7 +12467,7 @@
           <a:sym typeface="Arial"/>
         </a:defRPr>
       </a:lvl8pPr>
-      <a:lvl9pPr marR="0" lvl="8" algn="l" rtl="0">
+      <a:lvl9pPr marR="0" lvl="8" algn="l" rtl="0" eaLnBrk="1" hangingPunct="1">
         <a:lnSpc>
           <a:spcPct val="100000"/>
         </a:lnSpc>
@@ -12621,17 +12499,9 @@
 <file path=ppt/slides/slide1.xml><?xml version="1.0" encoding="utf-8"?>
 <p:sld xmlns:a="http://schemas.openxmlformats.org/drawingml/2006/main" xmlns:r="http://schemas.openxmlformats.org/officeDocument/2006/relationships" xmlns:p="http://schemas.openxmlformats.org/presentationml/2006/main">
   <p:cSld>
-    <p:bg>
-      <p:bgPr>
-        <a:solidFill>
-          <a:schemeClr val="lt1"/>
-        </a:solidFill>
-        <a:effectLst/>
-      </p:bgPr>
-    </p:bg>
     <p:spTree>
       <p:nvGrpSpPr>
-        <p:cNvPr id="1" name="Shape 93"/>
+        <p:cNvPr id="1" name=""/>
         <p:cNvGrpSpPr/>
         <p:nvPr/>
       </p:nvGrpSpPr>
@@ -12645,52 +12515,29 @@
       </p:grpSpPr>
       <p:sp>
         <p:nvSpPr>
-          <p:cNvPr id="94" name="Google Shape;94;p1"/>
-          <p:cNvSpPr txBox="1">
+          <p:cNvPr id="4" name="Title 3">
+            <a:extLst>
+              <a:ext uri="{FF2B5EF4-FFF2-40B4-BE49-F238E27FC236}">
+                <a16:creationId xmlns:a16="http://schemas.microsoft.com/office/drawing/2014/main" id="{8CF244ED-D6F4-444F-9A93-9766C38B9239}"/>
+              </a:ext>
+            </a:extLst>
+          </p:cNvPr>
+          <p:cNvSpPr>
             <a:spLocks noGrp="1"/>
           </p:cNvSpPr>
           <p:nvPr>
             <p:ph type="ctrTitle"/>
           </p:nvPr>
         </p:nvSpPr>
-        <p:spPr>
-          <a:xfrm>
-            <a:off x="442543" y="1122363"/>
-            <a:ext cx="9144000" cy="2387600"/>
-          </a:xfrm>
-          <a:prstGeom prst="rect">
-            <a:avLst/>
-          </a:prstGeom>
-          <a:noFill/>
-          <a:ln>
-            <a:noFill/>
-          </a:ln>
-        </p:spPr>
+        <p:spPr/>
         <p:txBody>
-          <a:bodyPr spcFirstLastPara="1" wrap="square" lIns="91425" tIns="45700" rIns="91425" bIns="45700" anchor="b" anchorCtr="0">
+          <a:bodyPr>
             <a:normAutofit/>
           </a:bodyPr>
           <a:lstStyle/>
           <a:p>
-            <a:pPr marL="0" lvl="0" indent="0" algn="ctr" rtl="1">
-              <a:lnSpc>
-                <a:spcPct val="90000"/>
-              </a:lnSpc>
-              <a:spcBef>
-                <a:spcPts val="0"/>
-              </a:spcBef>
-              <a:spcAft>
-                <a:spcPts val="0"/>
-              </a:spcAft>
-              <a:buClr>
-                <a:srgbClr val="FEC630"/>
-              </a:buClr>
-              <a:buSzPts val="4800"/>
-              <a:buFont typeface="Arial"/>
-              <a:buNone/>
-            </a:pPr>
-            <a:r>
-              <a:rPr lang="en" sz="4800" b="1">
+            <a:r>
+              <a:rPr lang="en-GB" sz="4800" b="1" dirty="0">
                 <a:solidFill>
                   <a:srgbClr val="FEC630"/>
                 </a:solidFill>
@@ -12701,65 +12548,33 @@
               </a:rPr>
               <a:t>Learn OpenUI5 step by step</a:t>
             </a:r>
-            <a:endParaRPr sz="4800" b="1">
-              <a:solidFill>
-                <a:srgbClr val="FEC630"/>
-              </a:solidFill>
-              <a:latin typeface="Arial"/>
-              <a:ea typeface="Arial"/>
-              <a:cs typeface="Arial"/>
-              <a:sym typeface="Arial"/>
-            </a:endParaRPr>
+            <a:endParaRPr lang="en-US" sz="4800" dirty="0"/>
           </a:p>
         </p:txBody>
       </p:sp>
       <p:sp>
         <p:nvSpPr>
-          <p:cNvPr id="95" name="Google Shape;95;p1"/>
-          <p:cNvSpPr txBox="1">
+          <p:cNvPr id="5" name="Subtitle 4">
+            <a:extLst>
+              <a:ext uri="{FF2B5EF4-FFF2-40B4-BE49-F238E27FC236}">
+                <a16:creationId xmlns:a16="http://schemas.microsoft.com/office/drawing/2014/main" id="{C48A2EB2-54C7-4457-B127-745BAEFCD157}"/>
+              </a:ext>
+            </a:extLst>
+          </p:cNvPr>
+          <p:cNvSpPr>
             <a:spLocks noGrp="1"/>
           </p:cNvSpPr>
           <p:nvPr>
             <p:ph type="subTitle" idx="1"/>
           </p:nvPr>
         </p:nvSpPr>
-        <p:spPr>
-          <a:xfrm>
-            <a:off x="442543" y="3602038"/>
-            <a:ext cx="9144000" cy="1655762"/>
-          </a:xfrm>
-          <a:prstGeom prst="rect">
-            <a:avLst/>
-          </a:prstGeom>
-          <a:noFill/>
-          <a:ln>
-            <a:noFill/>
-          </a:ln>
-        </p:spPr>
+        <p:spPr/>
         <p:txBody>
-          <a:bodyPr spcFirstLastPara="1" wrap="square" lIns="91425" tIns="45700" rIns="91425" bIns="45700" anchor="t" anchorCtr="0">
-            <a:normAutofit/>
-          </a:bodyPr>
+          <a:bodyPr/>
           <a:lstStyle/>
           <a:p>
-            <a:pPr marL="0" lvl="0" indent="0" algn="ctr" rtl="0">
-              <a:lnSpc>
-                <a:spcPct val="90000"/>
-              </a:lnSpc>
-              <a:spcBef>
-                <a:spcPts val="0"/>
-              </a:spcBef>
-              <a:spcAft>
-                <a:spcPts val="0"/>
-              </a:spcAft>
-              <a:buClr>
-                <a:srgbClr val="FF5969"/>
-              </a:buClr>
-              <a:buSzPts val="2400"/>
-              <a:buNone/>
-            </a:pPr>
-            <a:r>
-              <a:rPr lang="en">
+            <a:r>
+              <a:rPr lang="en-US" dirty="0">
                 <a:solidFill>
                   <a:srgbClr val="FF5969"/>
                 </a:solidFill>
@@ -12770,26 +12585,23 @@
               </a:rPr>
               <a:t>Lesson #1</a:t>
             </a:r>
-            <a:endParaRPr>
-              <a:solidFill>
-                <a:srgbClr val="FF5969"/>
-              </a:solidFill>
-              <a:latin typeface="Arial"/>
-              <a:ea typeface="Arial"/>
-              <a:cs typeface="Arial"/>
-              <a:sym typeface="Arial"/>
-            </a:endParaRPr>
           </a:p>
         </p:txBody>
       </p:sp>
       <p:pic>
         <p:nvPicPr>
-          <p:cNvPr id="96" name="Google Shape;96;p1"/>
+          <p:cNvPr id="8" name="Google Shape;96;p1">
+            <a:extLst>
+              <a:ext uri="{FF2B5EF4-FFF2-40B4-BE49-F238E27FC236}">
+                <a16:creationId xmlns:a16="http://schemas.microsoft.com/office/drawing/2014/main" id="{06A4ABFB-7808-477B-9091-25CD9CF5D0F7}"/>
+              </a:ext>
+            </a:extLst>
+          </p:cNvPr>
           <p:cNvPicPr preferRelativeResize="0"/>
           <p:nvPr/>
         </p:nvPicPr>
         <p:blipFill rotWithShape="1">
-          <a:blip r:embed="rId3">
+          <a:blip r:embed="rId2">
             <a:alphaModFix/>
           </a:blip>
           <a:srcRect/>
@@ -12811,7 +12623,13 @@
       </p:pic>
       <p:sp>
         <p:nvSpPr>
-          <p:cNvPr id="97" name="Google Shape;97;p1"/>
+          <p:cNvPr id="9" name="Google Shape;97;p1">
+            <a:extLst>
+              <a:ext uri="{FF2B5EF4-FFF2-40B4-BE49-F238E27FC236}">
+                <a16:creationId xmlns:a16="http://schemas.microsoft.com/office/drawing/2014/main" id="{D63541DA-17B6-41CC-BE49-4E599149E910}"/>
+              </a:ext>
+            </a:extLst>
+          </p:cNvPr>
           <p:cNvSpPr txBox="1"/>
           <p:nvPr/>
         </p:nvSpPr>
@@ -12836,7 +12654,20 @@
           <a:p>
             <a:pPr lvl="0"/>
             <a:r>
-              <a:rPr lang="en" sz="1800" b="0" i="0" u="none" strike="noStrike" cap="none">
+              <a:rPr lang="en-US" b="1" dirty="0">
+                <a:solidFill>
+                  <a:schemeClr val="accent1"/>
+                </a:solidFill>
+                <a:latin typeface="Font Awesome 5 Free Solid" panose="02000503000000000000" pitchFamily="50" charset="0"/>
+              </a:rPr>
+              <a:t></a:t>
+            </a:r>
+            <a:r>
+              <a:rPr lang="en-US" b="1" dirty="0"/>
+              <a:t> </a:t>
+            </a:r>
+            <a:r>
+              <a:rPr lang="en" sz="1800" b="0" i="0" u="none" strike="noStrike" cap="none" dirty="0">
                 <a:solidFill>
                   <a:srgbClr val="0070C0"/>
                 </a:solidFill>
@@ -12845,10 +12676,10 @@
                 <a:cs typeface="Calibri"/>
                 <a:sym typeface="Calibri"/>
               </a:rPr>
-              <a:t>Presented </a:t>
-            </a:r>
-            <a:r>
-              <a:rPr lang="en" sz="1800" b="0" i="0" u="none" strike="noStrike" cap="none" dirty="0">
+              <a:t>Presented by: Mahdi &amp; </a:t>
+            </a:r>
+            <a:r>
+              <a:rPr lang="en-US" sz="1800" b="0" i="0" u="none" strike="noStrike" cap="none" dirty="0">
                 <a:solidFill>
                   <a:srgbClr val="0070C0"/>
                 </a:solidFill>
@@ -12857,7 +12688,7 @@
                 <a:cs typeface="Calibri"/>
                 <a:sym typeface="Calibri"/>
               </a:rPr>
-              <a:t>by: Mahdi J.Ansari</a:t>
+              <a:t>Niels</a:t>
             </a:r>
             <a:endParaRPr sz="1800" dirty="0">
               <a:solidFill>
@@ -12873,14 +12704,20 @@
       </p:sp>
       <p:sp>
         <p:nvSpPr>
-          <p:cNvPr id="98" name="Google Shape;98;p1"/>
+          <p:cNvPr id="10" name="Google Shape;98;p1">
+            <a:extLst>
+              <a:ext uri="{FF2B5EF4-FFF2-40B4-BE49-F238E27FC236}">
+                <a16:creationId xmlns:a16="http://schemas.microsoft.com/office/drawing/2014/main" id="{AC535F3A-52AB-4849-A7B9-A695917DE379}"/>
+              </a:ext>
+            </a:extLst>
+          </p:cNvPr>
           <p:cNvSpPr txBox="1"/>
           <p:nvPr/>
         </p:nvSpPr>
         <p:spPr>
           <a:xfrm>
-            <a:off x="4078902" y="6268064"/>
-            <a:ext cx="2150204" cy="369332"/>
+            <a:off x="3936424" y="6268064"/>
+            <a:ext cx="2657779" cy="369291"/>
           </a:xfrm>
           <a:prstGeom prst="rect">
             <a:avLst/>
@@ -12896,17 +12733,22 @@
           </a:bodyPr>
           <a:lstStyle/>
           <a:p>
-            <a:pPr marL="0" marR="0" lvl="0" indent="0" algn="l" rtl="0">
-              <a:spcBef>
-                <a:spcPts val="0"/>
-              </a:spcBef>
-              <a:spcAft>
-                <a:spcPts val="0"/>
-              </a:spcAft>
-              <a:buNone/>
-            </a:pPr>
-            <a:r>
-              <a:rPr lang="en" sz="1800" dirty="0">
+            <a:pPr lvl="0"/>
+            <a:r>
+              <a:rPr lang="en-US" b="1" dirty="0">
+                <a:solidFill>
+                  <a:schemeClr val="accent1"/>
+                </a:solidFill>
+                <a:latin typeface="Font Awesome 5 Free Solid" panose="02000503000000000000" pitchFamily="50" charset="0"/>
+              </a:rPr>
+              <a:t></a:t>
+            </a:r>
+            <a:r>
+              <a:rPr lang="en-US" b="1" dirty="0"/>
+              <a:t> </a:t>
+            </a:r>
+            <a:r>
+              <a:rPr lang="en-US" dirty="0">
                 <a:solidFill>
                   <a:srgbClr val="0070C0"/>
                 </a:solidFill>
@@ -12915,30 +12757,52 @@
                 <a:cs typeface="Calibri"/>
                 <a:sym typeface="Calibri"/>
               </a:rPr>
-              <a:t>www.mjzsoft.com</a:t>
-            </a:r>
-            <a:endParaRPr sz="1800" dirty="0">
-              <a:solidFill>
-                <a:srgbClr val="0070C0"/>
-              </a:solidFill>
-              <a:latin typeface="Calibri"/>
-              <a:ea typeface="Calibri"/>
-              <a:cs typeface="Calibri"/>
-              <a:sym typeface="Calibri"/>
-            </a:endParaRPr>
+              <a:t>linkedin.com/in/</a:t>
+            </a:r>
+            <a:r>
+              <a:rPr lang="en-US" dirty="0" err="1">
+                <a:solidFill>
+                  <a:srgbClr val="0070C0"/>
+                </a:solidFill>
+                <a:latin typeface="Calibri"/>
+                <a:ea typeface="Calibri"/>
+                <a:cs typeface="Calibri"/>
+                <a:sym typeface="Calibri"/>
+              </a:rPr>
+              <a:t>mjbza</a:t>
+            </a:r>
+            <a:r>
+              <a:rPr lang="en-US" dirty="0">
+                <a:solidFill>
+                  <a:srgbClr val="0070C0"/>
+                </a:solidFill>
+                <a:latin typeface="Calibri"/>
+                <a:ea typeface="Calibri"/>
+                <a:cs typeface="Calibri"/>
+                <a:sym typeface="Calibri"/>
+              </a:rPr>
+              <a:t>/</a:t>
+            </a:r>
+            <a:endParaRPr lang="en-US" dirty="0"/>
           </a:p>
         </p:txBody>
       </p:sp>
       <p:sp>
         <p:nvSpPr>
-          <p:cNvPr id="99" name="Google Shape;99;p1"/>
+          <p:cNvPr id="11" name="Google Shape;99;p1">
+            <a:extLst>
+              <a:ext uri="{FF2B5EF4-FFF2-40B4-BE49-F238E27FC236}">
+                <a16:creationId xmlns:a16="http://schemas.microsoft.com/office/drawing/2014/main" id="{109B380D-B3F1-4C9F-BD63-F843424EAAA4}"/>
+              </a:ext>
+            </a:extLst>
+          </p:cNvPr>
           <p:cNvSpPr txBox="1"/>
           <p:nvPr/>
         </p:nvSpPr>
         <p:spPr>
           <a:xfrm>
             <a:off x="6862393" y="6268064"/>
-            <a:ext cx="2657779" cy="369332"/>
+            <a:ext cx="3046378" cy="369332"/>
           </a:xfrm>
           <a:prstGeom prst="rect">
             <a:avLst/>
@@ -12954,15 +12818,20 @@
           </a:bodyPr>
           <a:lstStyle/>
           <a:p>
-            <a:pPr marL="0" marR="0" lvl="0" indent="0" algn="l" rtl="0">
-              <a:spcBef>
-                <a:spcPts val="0"/>
-              </a:spcBef>
-              <a:spcAft>
-                <a:spcPts val="0"/>
-              </a:spcAft>
-              <a:buNone/>
-            </a:pPr>
+            <a:pPr lvl="0"/>
+            <a:r>
+              <a:rPr lang="en-US" b="1" dirty="0">
+                <a:solidFill>
+                  <a:schemeClr val="accent1"/>
+                </a:solidFill>
+                <a:latin typeface="Font Awesome 5 Free Solid" panose="02000503000000000000" pitchFamily="50" charset="0"/>
+              </a:rPr>
+              <a:t></a:t>
+            </a:r>
+            <a:r>
+              <a:rPr lang="en-US" b="1" dirty="0"/>
+              <a:t> </a:t>
+            </a:r>
             <a:r>
               <a:rPr lang="en" sz="1800" dirty="0">
                 <a:solidFill>
@@ -12973,13 +12842,42 @@
                 <a:cs typeface="Calibri"/>
                 <a:sym typeface="Calibri"/>
               </a:rPr>
-              <a:t>linkedin.com/in/mjbza/</a:t>
+              <a:t>linkedin.com/in/</a:t>
+            </a:r>
+            <a:r>
+              <a:rPr lang="en-US" sz="1800" dirty="0" err="1">
+                <a:solidFill>
+                  <a:srgbClr val="0070C0"/>
+                </a:solidFill>
+                <a:latin typeface="Calibri"/>
+                <a:ea typeface="Calibri"/>
+                <a:cs typeface="Calibri"/>
+                <a:sym typeface="Calibri"/>
+              </a:rPr>
+              <a:t>nautrata</a:t>
+            </a:r>
+            <a:r>
+              <a:rPr lang="en" sz="1800" dirty="0">
+                <a:solidFill>
+                  <a:srgbClr val="0070C0"/>
+                </a:solidFill>
+                <a:latin typeface="Calibri"/>
+                <a:ea typeface="Calibri"/>
+                <a:cs typeface="Calibri"/>
+                <a:sym typeface="Calibri"/>
+              </a:rPr>
+              <a:t>/</a:t>
             </a:r>
             <a:endParaRPr dirty="0"/>
           </a:p>
         </p:txBody>
       </p:sp>
     </p:spTree>
+    <p:extLst>
+      <p:ext uri="{BB962C8B-B14F-4D97-AF65-F5344CB8AC3E}">
+        <p14:creationId xmlns:p14="http://schemas.microsoft.com/office/powerpoint/2010/main" val="3387734524"/>
+      </p:ext>
+    </p:extLst>
   </p:cSld>
   <p:clrMapOvr>
     <a:masterClrMapping/>
@@ -17074,14 +16972,6 @@
 <file path=ppt/slides/slide3.xml><?xml version="1.0" encoding="utf-8"?>
 <p:sld xmlns:a="http://schemas.openxmlformats.org/drawingml/2006/main" xmlns:r="http://schemas.openxmlformats.org/officeDocument/2006/relationships" xmlns:p="http://schemas.openxmlformats.org/presentationml/2006/main">
   <p:cSld>
-    <p:bg>
-      <p:bgPr>
-        <a:solidFill>
-          <a:schemeClr val="lt1"/>
-        </a:solidFill>
-        <a:effectLst/>
-      </p:bgPr>
-    </p:bg>
     <p:spTree>
       <p:nvGrpSpPr>
         <p:cNvPr id="1" name="Shape 113"/>
@@ -18160,8 +18050,8 @@
         </p:nvSpPr>
         <p:spPr>
           <a:xfrm>
-            <a:off x="1066799" y="6478425"/>
-            <a:ext cx="8618483" cy="307777"/>
+            <a:off x="152399" y="6478425"/>
+            <a:ext cx="9826539" cy="338554"/>
           </a:xfrm>
           <a:prstGeom prst="rect">
             <a:avLst/>
@@ -18174,7 +18064,7 @@
           <a:lstStyle/>
           <a:p>
             <a:r>
-              <a:rPr lang="en-US" b="1" dirty="0">
+              <a:rPr lang="en-US" sz="1600" b="1" dirty="0">
                 <a:solidFill>
                   <a:srgbClr val="FF0000"/>
                 </a:solidFill>
@@ -18990,7 +18880,7 @@
             </a:r>
             <a:r>
               <a:rPr lang="en-GB" dirty="0"/>
-              <a:t>:  is an open source Node.js based development environment to support application developers. </a:t>
+              <a:t>  is an open source Node.js based development environment to support application developers. </a:t>
             </a:r>
           </a:p>
         </p:txBody>
@@ -19612,7 +19502,7 @@
 </file>
 
 <file path=ppt/theme/theme1.xml><?xml version="1.0" encoding="utf-8"?>
-<a:theme xmlns:a="http://schemas.openxmlformats.org/drawingml/2006/main" name="Office">
+<a:theme xmlns:a="http://schemas.openxmlformats.org/drawingml/2006/main" name="MJZSoft">
   <a:themeElements>
     <a:clrScheme name="Office">
       <a:dk1>
@@ -19889,58 +19779,63 @@
   </a:themeElements>
   <a:objectDefaults/>
   <a:extraClrSchemeLst/>
+  <a:extLst>
+    <a:ext uri="{05A4C25C-085E-4340-85A3-A5531E510DB2}">
+      <thm15:themeFamily xmlns:thm15="http://schemas.microsoft.com/office/thememl/2012/main" name="UI5_000.potx" id="{73CA3967-3982-45EC-B2AA-1CD95872F28C}" vid="{0FBD3BE1-B613-43EC-9EB5-6BEF2D3B269B}"/>
+    </a:ext>
+  </a:extLst>
 </a:theme>
 </file>
 
 <file path=ppt/theme/theme2.xml><?xml version="1.0" encoding="utf-8"?>
-<a:theme xmlns:a="http://schemas.openxmlformats.org/drawingml/2006/main">
+<a:theme xmlns:a="http://schemas.openxmlformats.org/drawingml/2006/main" name="Office Theme">
   <a:themeElements>
-    <a:clrScheme name="Default">
+    <a:clrScheme name="Office">
       <a:dk1>
-        <a:srgbClr val="000000"/>
+        <a:sysClr val="windowText" lastClr="000000"/>
       </a:dk1>
       <a:lt1>
-        <a:srgbClr val="FFFFFF"/>
+        <a:sysClr val="window" lastClr="FFFFFF"/>
       </a:lt1>
       <a:dk2>
-        <a:srgbClr val="158158"/>
+        <a:srgbClr val="44546A"/>
       </a:dk2>
       <a:lt2>
-        <a:srgbClr val="F3F3F3"/>
+        <a:srgbClr val="E7E6E6"/>
       </a:lt2>
       <a:accent1>
-        <a:srgbClr val="058DC7"/>
+        <a:srgbClr val="4472C4"/>
       </a:accent1>
       <a:accent2>
-        <a:srgbClr val="50B432"/>
+        <a:srgbClr val="ED7D31"/>
       </a:accent2>
       <a:accent3>
-        <a:srgbClr val="ED561B"/>
+        <a:srgbClr val="A5A5A5"/>
       </a:accent3>
       <a:accent4>
-        <a:srgbClr val="EDEF00"/>
+        <a:srgbClr val="FFC000"/>
       </a:accent4>
       <a:accent5>
-        <a:srgbClr val="24CBE5"/>
+        <a:srgbClr val="5B9BD5"/>
       </a:accent5>
       <a:accent6>
-        <a:srgbClr val="64E572"/>
+        <a:srgbClr val="70AD47"/>
       </a:accent6>
       <a:hlink>
-        <a:srgbClr val="2200CC"/>
+        <a:srgbClr val="0563C1"/>
       </a:hlink>
       <a:folHlink>
-        <a:srgbClr val="551A8B"/>
+        <a:srgbClr val="954F72"/>
       </a:folHlink>
     </a:clrScheme>
     <a:fontScheme name="Office">
       <a:majorFont>
-        <a:latin typeface="Arial"/>
+        <a:latin typeface="Calibri Light" panose="020F0302020204030204"/>
         <a:ea typeface=""/>
         <a:cs typeface=""/>
-        <a:font script="Jpan" typeface="ＭＳ Ｐゴシック"/>
+        <a:font script="Jpan" typeface="游ゴシック Light"/>
         <a:font script="Hang" typeface="맑은 고딕"/>
-        <a:font script="Hans" typeface="宋体"/>
+        <a:font script="Hans" typeface="等线 Light"/>
         <a:font script="Hant" typeface="新細明體"/>
         <a:font script="Arab" typeface="Times New Roman"/>
         <a:font script="Hebr" typeface="Times New Roman"/>
@@ -19968,14 +19863,31 @@
         <a:font script="Viet" typeface="Times New Roman"/>
         <a:font script="Uigh" typeface="Microsoft Uighur"/>
         <a:font script="Geor" typeface="Sylfaen"/>
+        <a:font script="Armn" typeface="Arial"/>
+        <a:font script="Bugi" typeface="Leelawadee UI"/>
+        <a:font script="Bopo" typeface="Microsoft JhengHei"/>
+        <a:font script="Java" typeface="Javanese Text"/>
+        <a:font script="Lisu" typeface="Segoe UI"/>
+        <a:font script="Mymr" typeface="Myanmar Text"/>
+        <a:font script="Nkoo" typeface="Ebrima"/>
+        <a:font script="Olck" typeface="Nirmala UI"/>
+        <a:font script="Osma" typeface="Ebrima"/>
+        <a:font script="Phag" typeface="Phagspa"/>
+        <a:font script="Syrn" typeface="Estrangelo Edessa"/>
+        <a:font script="Syrj" typeface="Estrangelo Edessa"/>
+        <a:font script="Syre" typeface="Estrangelo Edessa"/>
+        <a:font script="Sora" typeface="Nirmala UI"/>
+        <a:font script="Tale" typeface="Microsoft Tai Le"/>
+        <a:font script="Talu" typeface="Microsoft New Tai Lue"/>
+        <a:font script="Tfng" typeface="Ebrima"/>
       </a:majorFont>
       <a:minorFont>
-        <a:latin typeface="Arial"/>
+        <a:latin typeface="Calibri" panose="020F0502020204030204"/>
         <a:ea typeface=""/>
         <a:cs typeface=""/>
-        <a:font script="Jpan" typeface="ＭＳ Ｐゴシック"/>
+        <a:font script="Jpan" typeface="游ゴシック"/>
         <a:font script="Hang" typeface="맑은 고딕"/>
-        <a:font script="Hans" typeface="宋体"/>
+        <a:font script="Hans" typeface="等线"/>
         <a:font script="Hant" typeface="新細明體"/>
         <a:font script="Arab" typeface="Arial"/>
         <a:font script="Hebr" typeface="Arial"/>
@@ -20003,6 +19915,23 @@
         <a:font script="Viet" typeface="Arial"/>
         <a:font script="Uigh" typeface="Microsoft Uighur"/>
         <a:font script="Geor" typeface="Sylfaen"/>
+        <a:font script="Armn" typeface="Arial"/>
+        <a:font script="Bugi" typeface="Leelawadee UI"/>
+        <a:font script="Bopo" typeface="Microsoft JhengHei"/>
+        <a:font script="Java" typeface="Javanese Text"/>
+        <a:font script="Lisu" typeface="Segoe UI"/>
+        <a:font script="Mymr" typeface="Myanmar Text"/>
+        <a:font script="Nkoo" typeface="Ebrima"/>
+        <a:font script="Olck" typeface="Nirmala UI"/>
+        <a:font script="Osma" typeface="Ebrima"/>
+        <a:font script="Phag" typeface="Phagspa"/>
+        <a:font script="Syrn" typeface="Estrangelo Edessa"/>
+        <a:font script="Syrj" typeface="Estrangelo Edessa"/>
+        <a:font script="Syre" typeface="Estrangelo Edessa"/>
+        <a:font script="Sora" typeface="Nirmala UI"/>
+        <a:font script="Tale" typeface="Microsoft Tai Le"/>
+        <a:font script="Talu" typeface="Microsoft New Tai Lue"/>
+        <a:font script="Tfng" typeface="Ebrima"/>
       </a:minorFont>
     </a:fontScheme>
     <a:fmtScheme name="Office">
@@ -20014,161 +19943,141 @@
           <a:gsLst>
             <a:gs pos="0">
               <a:schemeClr val="phClr">
-                <a:tint val="50000"/>
-                <a:satMod val="300000"/>
+                <a:lumMod val="110000"/>
+                <a:satMod val="105000"/>
+                <a:tint val="67000"/>
               </a:schemeClr>
             </a:gs>
-            <a:gs pos="35000">
+            <a:gs pos="50000">
               <a:schemeClr val="phClr">
-                <a:tint val="37000"/>
-                <a:satMod val="300000"/>
+                <a:lumMod val="105000"/>
+                <a:satMod val="103000"/>
+                <a:tint val="73000"/>
               </a:schemeClr>
             </a:gs>
             <a:gs pos="100000">
               <a:schemeClr val="phClr">
-                <a:tint val="15000"/>
-                <a:satMod val="350000"/>
+                <a:lumMod val="105000"/>
+                <a:satMod val="109000"/>
+                <a:tint val="81000"/>
               </a:schemeClr>
             </a:gs>
           </a:gsLst>
-          <a:lin ang="16200000" scaled="1"/>
+          <a:lin ang="5400000" scaled="0"/>
         </a:gradFill>
         <a:gradFill rotWithShape="1">
           <a:gsLst>
             <a:gs pos="0">
               <a:schemeClr val="phClr">
-                <a:tint val="100000"/>
+                <a:satMod val="103000"/>
+                <a:lumMod val="102000"/>
+                <a:tint val="94000"/>
+              </a:schemeClr>
+            </a:gs>
+            <a:gs pos="50000">
+              <a:schemeClr val="phClr">
+                <a:satMod val="110000"/>
+                <a:lumMod val="100000"/>
                 <a:shade val="100000"/>
-                <a:satMod val="130000"/>
               </a:schemeClr>
             </a:gs>
             <a:gs pos="100000">
               <a:schemeClr val="phClr">
-                <a:tint val="50000"/>
-                <a:shade val="100000"/>
-                <a:satMod val="350000"/>
+                <a:lumMod val="99000"/>
+                <a:satMod val="120000"/>
+                <a:shade val="78000"/>
               </a:schemeClr>
             </a:gs>
           </a:gsLst>
-          <a:lin ang="16200000" scaled="0"/>
+          <a:lin ang="5400000" scaled="0"/>
         </a:gradFill>
       </a:fillStyleLst>
       <a:lnStyleLst>
-        <a:ln w="9525" cap="flat" cmpd="sng" algn="ctr">
-          <a:solidFill>
-            <a:schemeClr val="phClr">
-              <a:shade val="95000"/>
-              <a:satMod val="105000"/>
-            </a:schemeClr>
-          </a:solidFill>
-          <a:prstDash val="solid"/>
-        </a:ln>
-        <a:ln w="25400" cap="flat" cmpd="sng" algn="ctr">
+        <a:ln w="6350" cap="flat" cmpd="sng" algn="ctr">
           <a:solidFill>
             <a:schemeClr val="phClr"/>
           </a:solidFill>
           <a:prstDash val="solid"/>
+          <a:miter lim="800000"/>
         </a:ln>
-        <a:ln w="38100" cap="flat" cmpd="sng" algn="ctr">
+        <a:ln w="12700" cap="flat" cmpd="sng" algn="ctr">
           <a:solidFill>
             <a:schemeClr val="phClr"/>
           </a:solidFill>
           <a:prstDash val="solid"/>
+          <a:miter lim="800000"/>
+        </a:ln>
+        <a:ln w="19050" cap="flat" cmpd="sng" algn="ctr">
+          <a:solidFill>
+            <a:schemeClr val="phClr"/>
+          </a:solidFill>
+          <a:prstDash val="solid"/>
+          <a:miter lim="800000"/>
         </a:ln>
       </a:lnStyleLst>
       <a:effectStyleLst>
         <a:effectStyle>
+          <a:effectLst/>
+        </a:effectStyle>
+        <a:effectStyle>
+          <a:effectLst/>
+        </a:effectStyle>
+        <a:effectStyle>
           <a:effectLst>
-            <a:outerShdw blurRad="40000" dist="20000" dir="5400000" rotWithShape="0">
+            <a:outerShdw blurRad="57150" dist="19050" dir="5400000" algn="ctr" rotWithShape="0">
               <a:srgbClr val="000000">
-                <a:alpha val="38000"/>
+                <a:alpha val="63000"/>
               </a:srgbClr>
             </a:outerShdw>
           </a:effectLst>
-        </a:effectStyle>
-        <a:effectStyle>
-          <a:effectLst>
-            <a:outerShdw blurRad="40000" dist="23000" dir="5400000" rotWithShape="0">
-              <a:srgbClr val="000000">
-                <a:alpha val="35000"/>
-              </a:srgbClr>
-            </a:outerShdw>
-          </a:effectLst>
-        </a:effectStyle>
-        <a:effectStyle>
-          <a:effectLst>
-            <a:outerShdw blurRad="40000" dist="23000" dir="5400000" rotWithShape="0">
-              <a:srgbClr val="000000">
-                <a:alpha val="35000"/>
-              </a:srgbClr>
-            </a:outerShdw>
-          </a:effectLst>
-          <a:scene3d>
-            <a:camera prst="orthographicFront">
-              <a:rot lat="0" lon="0" rev="0"/>
-            </a:camera>
-            <a:lightRig rig="threePt" dir="t">
-              <a:rot lat="0" lon="0" rev="1200000"/>
-            </a:lightRig>
-          </a:scene3d>
-          <a:sp3d>
-            <a:bevelT w="63500" h="25400"/>
-          </a:sp3d>
         </a:effectStyle>
       </a:effectStyleLst>
       <a:bgFillStyleLst>
         <a:solidFill>
           <a:schemeClr val="phClr"/>
         </a:solidFill>
+        <a:solidFill>
+          <a:schemeClr val="phClr">
+            <a:tint val="95000"/>
+            <a:satMod val="170000"/>
+          </a:schemeClr>
+        </a:solidFill>
         <a:gradFill rotWithShape="1">
           <a:gsLst>
             <a:gs pos="0">
               <a:schemeClr val="phClr">
-                <a:tint val="40000"/>
-                <a:satMod val="350000"/>
+                <a:tint val="93000"/>
+                <a:satMod val="150000"/>
+                <a:shade val="98000"/>
+                <a:lumMod val="102000"/>
               </a:schemeClr>
             </a:gs>
-            <a:gs pos="40000">
+            <a:gs pos="50000">
               <a:schemeClr val="phClr">
-                <a:tint val="45000"/>
-                <a:shade val="99000"/>
-                <a:satMod val="350000"/>
+                <a:tint val="98000"/>
+                <a:satMod val="130000"/>
+                <a:shade val="90000"/>
+                <a:lumMod val="103000"/>
               </a:schemeClr>
             </a:gs>
             <a:gs pos="100000">
               <a:schemeClr val="phClr">
-                <a:shade val="20000"/>
-                <a:satMod val="255000"/>
+                <a:shade val="63000"/>
+                <a:satMod val="120000"/>
               </a:schemeClr>
             </a:gs>
           </a:gsLst>
-          <a:path path="circle">
-            <a:fillToRect l="50000" t="-80000" r="50000" b="180000"/>
-          </a:path>
-        </a:gradFill>
-        <a:gradFill rotWithShape="1">
-          <a:gsLst>
-            <a:gs pos="0">
-              <a:schemeClr val="phClr">
-                <a:tint val="80000"/>
-                <a:satMod val="300000"/>
-              </a:schemeClr>
-            </a:gs>
-            <a:gs pos="100000">
-              <a:schemeClr val="phClr">
-                <a:shade val="30000"/>
-                <a:satMod val="200000"/>
-              </a:schemeClr>
-            </a:gs>
-          </a:gsLst>
-          <a:path path="circle">
-            <a:fillToRect l="50000" t="50000" r="50000" b="50000"/>
-          </a:path>
+          <a:lin ang="5400000" scaled="0"/>
         </a:gradFill>
       </a:bgFillStyleLst>
     </a:fmtScheme>
   </a:themeElements>
   <a:objectDefaults/>
   <a:extraClrSchemeLst/>
+  <a:extLst>
+    <a:ext uri="{05A4C25C-085E-4340-85A3-A5531E510DB2}">
+      <thm15:themeFamily xmlns:thm15="http://schemas.microsoft.com/office/thememl/2012/main" name="Office Theme" id="{62F939B6-93AF-4DB8-9C6B-D6C7DFDC589F}" vid="{4A3C46E8-61CC-4603-A589-7422A47A8E4A}"/>
+    </a:ext>
+  </a:extLst>
 </a:theme>
 </file>
</xml_diff>